<commit_message>
feat: decouple db/, add presentation tools, rich text slides
Major refactor:
- Move agents.json to db/ folder (data separate from source)
- Add db/tools.json for custom tool definitions
- Add CRUD tools: db_agents.py, db_tools.py for Voyager-style persistence
- Add presentation tools: list_slides, add_slide, update_slide, delete_slide, generate_pptx

Presentation improvements:
- Rich text markup: **bold** and `code` in bullet slides
- Auto PDF generation (PowerPoint/Keynote/LibreOffice)
- Updated slide content with Voyager insight, tool architect, meta moment

CLI updates:
- Add `lightning db list-agents/list-tools/get-agent/get-tool` commands
- Remove manual presentation deps (python-pptx now required)

Docs:
- README: 10 agents, tools column, Voyager inspiration section
- CLAUDE.md: SDK primitives documentation

🤖 Generated with [Claude Code](https://claude.com/claude-code)

Co-Authored-By: Claude <noreply@anthropic.com>
</commit_message>
<xml_diff>
--- a/presentation/output/lightning-agents.pptx
+++ b/presentation/output/lightning-agents.pptx
@@ -3256,21 +3256,66 @@
               </a:defRPr>
             </a:pPr>
             <a:r>
-              <a:t>Key Hypotheses</a:t>
-            </a:r>
-          </a:p>
-        </p:txBody>
-      </p:sp>
-      <p:sp>
-        <p:nvSpPr>
-          <p:cNvPr id="3" name="TextBox 2"/>
+              <a:t>Demo: What We Built</a:t>
+            </a:r>
+          </a:p>
+        </p:txBody>
+      </p:sp>
+      <p:sp>
+        <p:nvSpPr>
+          <p:cNvPr id="3" name="Rounded Rectangle 2"/>
+          <p:cNvSpPr/>
+          <p:nvPr/>
+        </p:nvSpPr>
+        <p:spPr>
+          <a:xfrm>
+            <a:off x="731520" y="1463040"/>
+            <a:ext cx="10728655" cy="4937760"/>
+          </a:xfrm>
+          <a:prstGeom prst="roundRect">
+            <a:avLst/>
+          </a:prstGeom>
+          <a:solidFill>
+            <a:srgbClr val="F8F9FA"/>
+          </a:solidFill>
+          <a:ln>
+            <a:solidFill>
+              <a:srgbClr val="666666"/>
+            </a:solidFill>
+          </a:ln>
+        </p:spPr>
+        <p:style>
+          <a:lnRef idx="1">
+            <a:schemeClr val="accent1"/>
+          </a:lnRef>
+          <a:fillRef idx="3">
+            <a:schemeClr val="accent1"/>
+          </a:fillRef>
+          <a:effectRef idx="2">
+            <a:schemeClr val="accent1"/>
+          </a:effectRef>
+          <a:fontRef idx="minor">
+            <a:schemeClr val="lt1"/>
+          </a:fontRef>
+        </p:style>
+        <p:txBody>
+          <a:bodyPr rtlCol="0" anchor="ctr"/>
+          <a:lstStyle/>
+          <a:p>
+            <a:pPr algn="ctr"/>
+          </a:p>
+        </p:txBody>
+      </p:sp>
+      <p:sp>
+        <p:nvSpPr>
+          <p:cNvPr id="4" name="TextBox 3"/>
           <p:cNvSpPr txBox="1"/>
           <p:nvPr/>
         </p:nvSpPr>
         <p:spPr>
           <a:xfrm>
-            <a:off x="914400" y="1463040"/>
-            <a:ext cx="10362895" cy="5029200"/>
+            <a:off x="914400" y="1645920"/>
+            <a:ext cx="10362895" cy="4572000"/>
           </a:xfrm>
           <a:prstGeom prst="rect">
             <a:avLst/>
@@ -3278,56 +3323,119 @@
           <a:noFill/>
         </p:spPr>
         <p:txBody>
-          <a:bodyPr wrap="square">
+          <a:bodyPr wrap="none">
             <a:spAutoFit/>
           </a:bodyPr>
           <a:lstStyle/>
           <a:p>
             <a:pPr>
-              <a:spcBef>
-                <a:spcPts val="1600"/>
-              </a:spcBef>
-              <a:defRPr sz="1800">
-                <a:solidFill>
-                  <a:srgbClr val="1A1A2E"/>
-                </a:solidFill>
-                <a:latin typeface="Arial"/>
-              </a:defRPr>
-            </a:pPr>
-            <a:r>
-              <a:t>  H1: Declarative &gt; Imperative for agent configuration</a:t>
+              <a:defRPr sz="1400">
+                <a:solidFill>
+                  <a:srgbClr val="1A1A2E"/>
+                </a:solidFill>
+                <a:latin typeface="Consolas"/>
+              </a:defRPr>
+            </a:pPr>
+            <a:r>
+              <a:t>$ lightning list</a:t>
             </a:r>
           </a:p>
           <a:p>
             <a:pPr>
-              <a:spcBef>
-                <a:spcPts val="1600"/>
-              </a:spcBef>
-              <a:defRPr sz="1800">
-                <a:solidFill>
-                  <a:srgbClr val="1A1A2E"/>
-                </a:solidFill>
-                <a:latin typeface="Arial"/>
-              </a:defRPr>
-            </a:pPr>
-            <a:r>
-              <a:t>  H2: Runtime context injection enables reusability</a:t>
+              <a:defRPr sz="1400">
+                <a:solidFill>
+                  <a:srgbClr val="1A1A2E"/>
+                </a:solidFill>
+                <a:latin typeface="Consolas"/>
+              </a:defRPr>
+            </a:pPr>
+            <a:r>
+              <a:t>  10 agents: architect, tool_architect, paper_researcher...</a:t>
             </a:r>
           </a:p>
           <a:p>
             <a:pPr>
-              <a:spcBef>
-                <a:spcPts val="1600"/>
-              </a:spcBef>
-              <a:defRPr sz="1800">
-                <a:solidFill>
-                  <a:srgbClr val="1A1A2E"/>
-                </a:solidFill>
-                <a:latin typeface="Arial"/>
-              </a:defRPr>
-            </a:pPr>
-            <a:r>
-              <a:t>  H3: Architect agents enable organic system growth</a:t>
+              <a:defRPr sz="1400">
+                <a:solidFill>
+                  <a:srgbClr val="1A1A2E"/>
+                </a:solidFill>
+                <a:latin typeface="Consolas"/>
+              </a:defRPr>
+            </a:pPr>
+          </a:p>
+          <a:p>
+            <a:pPr>
+              <a:defRPr sz="1400">
+                <a:solidFill>
+                  <a:srgbClr val="1A1A2E"/>
+                </a:solidFill>
+                <a:latin typeface="Consolas"/>
+              </a:defRPr>
+            </a:pPr>
+            <a:r>
+              <a:t>$ lightning run paper_researcher "Find the Voyager paper"</a:t>
+            </a:r>
+          </a:p>
+          <a:p>
+            <a:pPr>
+              <a:defRPr sz="1400">
+                <a:solidFill>
+                  <a:srgbClr val="1A1A2E"/>
+                </a:solidFill>
+                <a:latin typeface="Consolas"/>
+              </a:defRPr>
+            </a:pPr>
+            <a:r>
+              <a:t>  Found: arxiv.org/abs/2305.16291</a:t>
+            </a:r>
+          </a:p>
+          <a:p>
+            <a:pPr>
+              <a:defRPr sz="1400">
+                <a:solidFill>
+                  <a:srgbClr val="1A1A2E"/>
+                </a:solidFill>
+                <a:latin typeface="Consolas"/>
+              </a:defRPr>
+            </a:pPr>
+            <a:r>
+              <a:t>  Downloaded: voyager_lifelong_learning.pdf</a:t>
+            </a:r>
+          </a:p>
+          <a:p>
+            <a:pPr>
+              <a:defRPr sz="1400">
+                <a:solidFill>
+                  <a:srgbClr val="1A1A2E"/>
+                </a:solidFill>
+                <a:latin typeface="Consolas"/>
+              </a:defRPr>
+            </a:pPr>
+          </a:p>
+          <a:p>
+            <a:pPr>
+              <a:defRPr sz="1400">
+                <a:solidFill>
+                  <a:srgbClr val="1A1A2E"/>
+                </a:solidFill>
+                <a:latin typeface="Consolas"/>
+              </a:defRPr>
+            </a:pPr>
+            <a:r>
+              <a:t>$ lightning run presentation_slide_writer "List slides"</a:t>
+            </a:r>
+          </a:p>
+          <a:p>
+            <a:pPr>
+              <a:defRPr sz="1400">
+                <a:solidFill>
+                  <a:srgbClr val="1A1A2E"/>
+                </a:solidFill>
+                <a:latin typeface="Consolas"/>
+              </a:defRPr>
+            </a:pPr>
+            <a:r>
+              <a:t>  12 slides in current presentation...</a:t>
             </a:r>
           </a:p>
         </p:txBody>
@@ -3381,66 +3489,21 @@
               </a:defRPr>
             </a:pPr>
             <a:r>
-              <a:t>Live Demo</a:t>
-            </a:r>
-          </a:p>
-        </p:txBody>
-      </p:sp>
-      <p:sp>
-        <p:nvSpPr>
-          <p:cNvPr id="3" name="Rounded Rectangle 2"/>
-          <p:cNvSpPr/>
-          <p:nvPr/>
-        </p:nvSpPr>
-        <p:spPr>
-          <a:xfrm>
-            <a:off x="731520" y="1463040"/>
-            <a:ext cx="10728655" cy="4937760"/>
-          </a:xfrm>
-          <a:prstGeom prst="roundRect">
-            <a:avLst/>
-          </a:prstGeom>
-          <a:solidFill>
-            <a:srgbClr val="F8F9FA"/>
-          </a:solidFill>
-          <a:ln>
-            <a:solidFill>
-              <a:srgbClr val="666666"/>
-            </a:solidFill>
-          </a:ln>
-        </p:spPr>
-        <p:style>
-          <a:lnRef idx="1">
-            <a:schemeClr val="accent1"/>
-          </a:lnRef>
-          <a:fillRef idx="3">
-            <a:schemeClr val="accent1"/>
-          </a:fillRef>
-          <a:effectRef idx="2">
-            <a:schemeClr val="accent1"/>
-          </a:effectRef>
-          <a:fontRef idx="minor">
-            <a:schemeClr val="lt1"/>
-          </a:fontRef>
-        </p:style>
-        <p:txBody>
-          <a:bodyPr rtlCol="0" anchor="ctr"/>
-          <a:lstStyle/>
-          <a:p>
-            <a:pPr algn="ctr"/>
-          </a:p>
-        </p:txBody>
-      </p:sp>
-      <p:sp>
-        <p:nvSpPr>
-          <p:cNvPr id="4" name="TextBox 3"/>
+              <a:t>The Meta Moment</a:t>
+            </a:r>
+          </a:p>
+        </p:txBody>
+      </p:sp>
+      <p:sp>
+        <p:nvSpPr>
+          <p:cNvPr id="3" name="TextBox 2"/>
           <p:cNvSpPr txBox="1"/>
           <p:nvPr/>
         </p:nvSpPr>
         <p:spPr>
           <a:xfrm>
-            <a:off x="914400" y="1645920"/>
-            <a:ext cx="10362895" cy="4572000"/>
+            <a:off x="914400" y="1463040"/>
+            <a:ext cx="10362895" cy="5029200"/>
           </a:xfrm>
           <a:prstGeom prst="rect">
             <a:avLst/>
@@ -3448,116 +3511,153 @@
           <a:noFill/>
         </p:spPr>
         <p:txBody>
-          <a:bodyPr wrap="none">
+          <a:bodyPr wrap="square">
             <a:spAutoFit/>
           </a:bodyPr>
           <a:lstStyle/>
           <a:p>
             <a:pPr>
-              <a:defRPr sz="1400">
-                <a:solidFill>
-                  <a:srgbClr val="1A1A2E"/>
+              <a:spcBef>
+                <a:spcPts val="1600"/>
+              </a:spcBef>
+            </a:pPr>
+            <a:r>
+              <a:rPr sz="1800">
+                <a:solidFill>
+                  <a:srgbClr val="1A1A2E"/>
+                </a:solidFill>
+                <a:latin typeface="Arial"/>
+              </a:rPr>
+              <a:t>We used </a:t>
+            </a:r>
+            <a:r>
+              <a:rPr sz="1600">
+                <a:solidFill>
+                  <a:srgbClr val="FF6B35"/>
                 </a:solidFill>
                 <a:latin typeface="Consolas"/>
-              </a:defRPr>
-            </a:pPr>
-            <a:r>
-              <a:t>$ lightning list</a:t>
+              </a:rPr>
+              <a:t>paper_researcher</a:t>
+            </a:r>
+            <a:r>
+              <a:rPr sz="1800">
+                <a:solidFill>
+                  <a:srgbClr val="1A1A2E"/>
+                </a:solidFill>
+                <a:latin typeface="Arial"/>
+              </a:rPr>
+              <a:t> to find the </a:t>
+            </a:r>
+            <a:r>
+              <a:rPr b="1" sz="1800">
+                <a:solidFill>
+                  <a:srgbClr val="0088CC"/>
+                </a:solidFill>
+                <a:latin typeface="Arial"/>
+              </a:rPr>
+              <a:t>Voyager paper</a:t>
             </a:r>
           </a:p>
           <a:p>
             <a:pPr>
-              <a:defRPr sz="1400">
-                <a:solidFill>
-                  <a:srgbClr val="1A1A2E"/>
+              <a:spcBef>
+                <a:spcPts val="1600"/>
+              </a:spcBef>
+            </a:pPr>
+            <a:r>
+              <a:rPr sz="1800">
+                <a:solidFill>
+                  <a:srgbClr val="1A1A2E"/>
+                </a:solidFill>
+                <a:latin typeface="Arial"/>
+              </a:rPr>
+              <a:t>Voyager inspired the </a:t>
+            </a:r>
+            <a:r>
+              <a:rPr b="1" sz="1800">
+                <a:solidFill>
+                  <a:srgbClr val="0088CC"/>
+                </a:solidFill>
+                <a:latin typeface="Arial"/>
+              </a:rPr>
+              <a:t>architect pattern</a:t>
+            </a:r>
+          </a:p>
+          <a:p>
+            <a:pPr>
+              <a:spcBef>
+                <a:spcPts val="1600"/>
+              </a:spcBef>
+            </a:pPr>
+            <a:r>
+              <a:rPr sz="1800">
+                <a:solidFill>
+                  <a:srgbClr val="1A1A2E"/>
+                </a:solidFill>
+                <a:latin typeface="Arial"/>
+              </a:rPr>
+              <a:t>We built </a:t>
+            </a:r>
+            <a:r>
+              <a:rPr sz="1600">
+                <a:solidFill>
+                  <a:srgbClr val="FF6B35"/>
                 </a:solidFill>
                 <a:latin typeface="Consolas"/>
-              </a:defRPr>
-            </a:pPr>
-            <a:r>
-              <a:t>  architect, aimug_researcher, lab_finder...</a:t>
+              </a:rPr>
+              <a:t>tool_architect</a:t>
+            </a:r>
+            <a:r>
+              <a:rPr sz="1800">
+                <a:solidFill>
+                  <a:srgbClr val="1A1A2E"/>
+                </a:solidFill>
+                <a:latin typeface="Arial"/>
+              </a:rPr>
+              <a:t> to create </a:t>
+            </a:r>
+            <a:r>
+              <a:rPr b="1" sz="1800">
+                <a:solidFill>
+                  <a:srgbClr val="0088CC"/>
+                </a:solidFill>
+                <a:latin typeface="Arial"/>
+              </a:rPr>
+              <a:t>more tools</a:t>
             </a:r>
           </a:p>
           <a:p>
             <a:pPr>
-              <a:defRPr sz="1400">
-                <a:solidFill>
-                  <a:srgbClr val="1A1A2E"/>
+              <a:spcBef>
+                <a:spcPts val="1600"/>
+              </a:spcBef>
+            </a:pPr>
+            <a:r>
+              <a:rPr sz="1600">
+                <a:solidFill>
+                  <a:srgbClr val="FF6B35"/>
                 </a:solidFill>
                 <a:latin typeface="Consolas"/>
-              </a:defRPr>
-            </a:pPr>
-          </a:p>
-          <a:p>
-            <a:pPr>
-              <a:defRPr sz="1400">
-                <a:solidFill>
-                  <a:srgbClr val="1A1A2E"/>
-                </a:solidFill>
-                <a:latin typeface="Consolas"/>
-              </a:defRPr>
-            </a:pPr>
-            <a:r>
-              <a:t>$ lightning architect "PR reviewer for security"</a:t>
-            </a:r>
-          </a:p>
-          <a:p>
-            <a:pPr>
-              <a:defRPr sz="1400">
-                <a:solidFill>
-                  <a:srgbClr val="1A1A2E"/>
-                </a:solidFill>
-                <a:latin typeface="Consolas"/>
-              </a:defRPr>
-            </a:pPr>
-          </a:p>
-          <a:p>
-            <a:pPr>
-              <a:defRPr sz="1400">
-                <a:solidFill>
-                  <a:srgbClr val="1A1A2E"/>
-                </a:solidFill>
-                <a:latin typeface="Consolas"/>
-              </a:defRPr>
-            </a:pPr>
-            <a:r>
-              <a:t>Created agent: security_reviewer</a:t>
-            </a:r>
-          </a:p>
-          <a:p>
-            <a:pPr>
-              <a:defRPr sz="1400">
-                <a:solidFill>
-                  <a:srgbClr val="1A1A2E"/>
-                </a:solidFill>
-                <a:latin typeface="Consolas"/>
-              </a:defRPr>
-            </a:pPr>
-            <a:r>
-              <a:t>Saved to: agents.json</a:t>
-            </a:r>
-          </a:p>
-          <a:p>
-            <a:pPr>
-              <a:defRPr sz="1400">
-                <a:solidFill>
-                  <a:srgbClr val="1A1A2E"/>
-                </a:solidFill>
-                <a:latin typeface="Consolas"/>
-              </a:defRPr>
-            </a:pPr>
-          </a:p>
-          <a:p>
-            <a:pPr>
-              <a:defRPr sz="1400">
-                <a:solidFill>
-                  <a:srgbClr val="1A1A2E"/>
-                </a:solidFill>
-                <a:latin typeface="Consolas"/>
-              </a:defRPr>
-            </a:pPr>
-            <a:r>
-              <a:t>$ lightning run security_reviewer "Review auth.py"</a:t>
+              </a:rPr>
+              <a:t>presentation_slide_writer</a:t>
+            </a:r>
+            <a:r>
+              <a:rPr sz="1800">
+                <a:solidFill>
+                  <a:srgbClr val="1A1A2E"/>
+                </a:solidFill>
+                <a:latin typeface="Arial"/>
+              </a:rPr>
+              <a:t> is building </a:t>
+            </a:r>
+            <a:r>
+              <a:rPr b="1" sz="1800">
+                <a:solidFill>
+                  <a:srgbClr val="0088CC"/>
+                </a:solidFill>
+                <a:latin typeface="Arial"/>
+              </a:rPr>
+              <a:t>THIS presentation</a:t>
             </a:r>
           </a:p>
         </p:txBody>
@@ -3642,15 +3742,51 @@
               <a:spcBef>
                 <a:spcPts val="1600"/>
               </a:spcBef>
-              <a:defRPr sz="1800">
-                <a:solidFill>
-                  <a:srgbClr val="1A1A2E"/>
-                </a:solidFill>
-                <a:latin typeface="Arial"/>
-              </a:defRPr>
-            </a:pPr>
-            <a:r>
-              <a:t>github.com/[your-repo]/lightning-agents</a:t>
+            </a:pPr>
+            <a:r>
+              <a:rPr b="1" sz="1800">
+                <a:solidFill>
+                  <a:srgbClr val="0088CC"/>
+                </a:solidFill>
+                <a:latin typeface="Arial"/>
+              </a:rPr>
+              <a:t>Agents</a:t>
+            </a:r>
+            <a:r>
+              <a:rPr sz="1800">
+                <a:solidFill>
+                  <a:srgbClr val="1A1A2E"/>
+                </a:solidFill>
+                <a:latin typeface="Arial"/>
+              </a:rPr>
+              <a:t> creating </a:t>
+            </a:r>
+            <a:r>
+              <a:rPr b="1" sz="1800">
+                <a:solidFill>
+                  <a:srgbClr val="0088CC"/>
+                </a:solidFill>
+                <a:latin typeface="Arial"/>
+              </a:rPr>
+              <a:t>agents</a:t>
+            </a:r>
+            <a:r>
+              <a:rPr sz="1800">
+                <a:solidFill>
+                  <a:srgbClr val="1A1A2E"/>
+                </a:solidFill>
+                <a:latin typeface="Arial"/>
+              </a:rPr>
+              <a:t> creating </a:t>
+            </a:r>
+            <a:r>
+              <a:rPr b="1" sz="1800">
+                <a:solidFill>
+                  <a:srgbClr val="0088CC"/>
+                </a:solidFill>
+                <a:latin typeface="Arial"/>
+              </a:rPr>
+              <a:t>tools</a:t>
             </a:r>
           </a:p>
           <a:p>
@@ -3658,15 +3794,42 @@
               <a:spcBef>
                 <a:spcPts val="1600"/>
               </a:spcBef>
-              <a:defRPr sz="1800">
-                <a:solidFill>
-                  <a:srgbClr val="1A1A2E"/>
-                </a:solidFill>
-                <a:latin typeface="Arial"/>
-              </a:defRPr>
-            </a:pPr>
-            <a:r>
-              <a:t>Built with Claude Agent SDK</a:t>
+            </a:pPr>
+            <a:r>
+              <a:rPr sz="1800">
+                <a:solidFill>
+                  <a:srgbClr val="1A1A2E"/>
+                </a:solidFill>
+                <a:latin typeface="Arial"/>
+              </a:rPr>
+              <a:t>Built with </a:t>
+            </a:r>
+            <a:r>
+              <a:rPr sz="1600">
+                <a:solidFill>
+                  <a:srgbClr val="FF6B35"/>
+                </a:solidFill>
+                <a:latin typeface="Consolas"/>
+              </a:rPr>
+              <a:t>Claude Agent SDK</a:t>
+            </a:r>
+            <a:r>
+              <a:rPr sz="1800">
+                <a:solidFill>
+                  <a:srgbClr val="1A1A2E"/>
+                </a:solidFill>
+                <a:latin typeface="Arial"/>
+              </a:rPr>
+              <a:t> + </a:t>
+            </a:r>
+            <a:r>
+              <a:rPr sz="1600">
+                <a:solidFill>
+                  <a:srgbClr val="FF6B35"/>
+                </a:solidFill>
+                <a:latin typeface="Consolas"/>
+              </a:rPr>
+              <a:t>MCP</a:t>
             </a:r>
           </a:p>
           <a:p>
@@ -3674,15 +3837,15 @@
               <a:spcBef>
                 <a:spcPts val="1600"/>
               </a:spcBef>
-              <a:defRPr sz="1800">
-                <a:solidFill>
-                  <a:srgbClr val="1A1A2E"/>
-                </a:solidFill>
-                <a:latin typeface="Arial"/>
-              </a:defRPr>
-            </a:pPr>
-            <a:r>
-              <a:t>Questions?</a:t>
+            </a:pPr>
+            <a:r>
+              <a:rPr sz="1600">
+                <a:solidFill>
+                  <a:srgbClr val="FF6B35"/>
+                </a:solidFill>
+                <a:latin typeface="Consolas"/>
+              </a:rPr>
+              <a:t>github.com/aimug-org/lightning-agents</a:t>
             </a:r>
           </a:p>
         </p:txBody>
@@ -3803,15 +3966,24 @@
               <a:spcBef>
                 <a:spcPts val="1600"/>
               </a:spcBef>
-              <a:defRPr sz="1800">
-                <a:solidFill>
-                  <a:srgbClr val="1A1A2E"/>
-                </a:solidFill>
-                <a:latin typeface="Arial"/>
-              </a:defRPr>
-            </a:pPr>
-            <a:r>
-              <a:t>  Hardcoded system prompts scattered across files</a:t>
+            </a:pPr>
+            <a:r>
+              <a:rPr sz="1800" b="1">
+                <a:solidFill>
+                  <a:srgbClr val="0088CC"/>
+                </a:solidFill>
+                <a:latin typeface="Arial"/>
+              </a:rPr>
+              <a:t>Hardcoded</a:t>
+            </a:r>
+            <a:r>
+              <a:rPr sz="1800">
+                <a:solidFill>
+                  <a:srgbClr val="1A1A2E"/>
+                </a:solidFill>
+                <a:latin typeface="Arial"/>
+              </a:rPr>
+              <a:t> system prompts scattered across files</a:t>
             </a:r>
           </a:p>
           <a:p>
@@ -3819,15 +3991,24 @@
               <a:spcBef>
                 <a:spcPts val="1600"/>
               </a:spcBef>
-              <a:defRPr sz="1800">
-                <a:solidFill>
-                  <a:srgbClr val="1A1A2E"/>
-                </a:solidFill>
-                <a:latin typeface="Arial"/>
-              </a:defRPr>
-            </a:pPr>
-            <a:r>
-              <a:t>  Tightly coupled agent definitions and execution logic</a:t>
+            </a:pPr>
+            <a:r>
+              <a:rPr sz="1800" b="1">
+                <a:solidFill>
+                  <a:srgbClr val="0088CC"/>
+                </a:solidFill>
+                <a:latin typeface="Arial"/>
+              </a:rPr>
+              <a:t>Tightly coupled</a:t>
+            </a:r>
+            <a:r>
+              <a:rPr sz="1800">
+                <a:solidFill>
+                  <a:srgbClr val="1A1A2E"/>
+                </a:solidFill>
+                <a:latin typeface="Arial"/>
+              </a:rPr>
+              <a:t> agent definitions and execution logic</a:t>
             </a:r>
           </a:p>
           <a:p>
@@ -3835,15 +4016,24 @@
               <a:spcBef>
                 <a:spcPts val="1600"/>
               </a:spcBef>
-              <a:defRPr sz="1800">
-                <a:solidFill>
-                  <a:srgbClr val="1A1A2E"/>
-                </a:solidFill>
-                <a:latin typeface="Arial"/>
-              </a:defRPr>
-            </a:pPr>
-            <a:r>
-              <a:t>  No standardized way to add new agents without code changes</a:t>
+            </a:pPr>
+            <a:r>
+              <a:rPr sz="1800">
+                <a:solidFill>
+                  <a:srgbClr val="1A1A2E"/>
+                </a:solidFill>
+                <a:latin typeface="Arial"/>
+              </a:rPr>
+              <a:t>No standardized way to add agents </a:t>
+            </a:r>
+            <a:r>
+              <a:rPr b="1" sz="1800">
+                <a:solidFill>
+                  <a:srgbClr val="0088CC"/>
+                </a:solidFill>
+                <a:latin typeface="Arial"/>
+              </a:rPr>
+              <a:t>without code changes</a:t>
             </a:r>
           </a:p>
           <a:p>
@@ -3851,15 +4041,33 @@
               <a:spcBef>
                 <a:spcPts val="1600"/>
               </a:spcBef>
-              <a:defRPr sz="1800">
-                <a:solidFill>
-                  <a:srgbClr val="1A1A2E"/>
-                </a:solidFill>
-                <a:latin typeface="Arial"/>
-              </a:defRPr>
-            </a:pPr>
-            <a:r>
-              <a:t>  Manual configuration duplication when agents share patterns</a:t>
+            </a:pPr>
+            <a:r>
+              <a:rPr sz="1800">
+                <a:solidFill>
+                  <a:srgbClr val="1A1A2E"/>
+                </a:solidFill>
+                <a:latin typeface="Arial"/>
+              </a:rPr>
+              <a:t>Manual </a:t>
+            </a:r>
+            <a:r>
+              <a:rPr b="1" sz="1800">
+                <a:solidFill>
+                  <a:srgbClr val="0088CC"/>
+                </a:solidFill>
+                <a:latin typeface="Arial"/>
+              </a:rPr>
+              <a:t>configuration duplication</a:t>
+            </a:r>
+            <a:r>
+              <a:rPr sz="1800">
+                <a:solidFill>
+                  <a:srgbClr val="1A1A2E"/>
+                </a:solidFill>
+                <a:latin typeface="Arial"/>
+              </a:rPr>
+              <a:t> when agents share patterns</a:t>
             </a:r>
           </a:p>
         </p:txBody>
@@ -5168,7 +5376,7 @@
               </a:defRPr>
             </a:pPr>
             <a:r>
-              <a:t>Runtime Context Injection</a:t>
+              <a:t>The Voyager Insight</a:t>
             </a:r>
           </a:p>
         </p:txBody>
@@ -5199,15 +5407,33 @@
               <a:spcBef>
                 <a:spcPts val="1600"/>
               </a:spcBef>
-              <a:defRPr sz="1800">
-                <a:solidFill>
-                  <a:srgbClr val="1A1A2E"/>
-                </a:solidFill>
-                <a:latin typeface="Arial"/>
-              </a:defRPr>
-            </a:pPr>
-            <a:r>
-              <a:t>  Same definition, different contexts</a:t>
+            </a:pPr>
+            <a:r>
+              <a:rPr sz="1800" b="1">
+                <a:solidFill>
+                  <a:srgbClr val="0088CC"/>
+                </a:solidFill>
+                <a:latin typeface="Arial"/>
+              </a:rPr>
+              <a:t>Voyager</a:t>
+            </a:r>
+            <a:r>
+              <a:rPr sz="1800">
+                <a:solidFill>
+                  <a:srgbClr val="1A1A2E"/>
+                </a:solidFill>
+                <a:latin typeface="Arial"/>
+              </a:rPr>
+              <a:t>: Minecraft AI with a growing </a:t>
+            </a:r>
+            <a:r>
+              <a:rPr b="1" sz="1800">
+                <a:solidFill>
+                  <a:srgbClr val="0088CC"/>
+                </a:solidFill>
+                <a:latin typeface="Arial"/>
+              </a:rPr>
+              <a:t>skill library</a:t>
             </a:r>
           </a:p>
           <a:p>
@@ -5215,15 +5441,33 @@
               <a:spcBef>
                 <a:spcPts val="1600"/>
               </a:spcBef>
-              <a:defRPr sz="1800">
-                <a:solidFill>
-                  <a:srgbClr val="1A1A2E"/>
-                </a:solidFill>
-                <a:latin typeface="Arial"/>
-              </a:defRPr>
-            </a:pPr>
-            <a:r>
-              <a:t>  Inject parameters at instantiation time</a:t>
+            </a:pPr>
+            <a:r>
+              <a:rPr sz="1800">
+                <a:solidFill>
+                  <a:srgbClr val="1A1A2E"/>
+                </a:solidFill>
+                <a:latin typeface="Arial"/>
+              </a:rPr>
+              <a:t>Learns new skills → </a:t>
+            </a:r>
+            <a:r>
+              <a:rPr b="1" sz="1800">
+                <a:solidFill>
+                  <a:srgbClr val="0088CC"/>
+                </a:solidFill>
+                <a:latin typeface="Arial"/>
+              </a:rPr>
+              <a:t>stores them</a:t>
+            </a:r>
+            <a:r>
+              <a:rPr sz="1800">
+                <a:solidFill>
+                  <a:srgbClr val="1A1A2E"/>
+                </a:solidFill>
+                <a:latin typeface="Arial"/>
+              </a:rPr>
+              <a:t> → reuses them</a:t>
             </a:r>
           </a:p>
           <a:p>
@@ -5231,15 +5475,24 @@
               <a:spcBef>
                 <a:spcPts val="1600"/>
               </a:spcBef>
-              <a:defRPr sz="1800">
-                <a:solidFill>
-                  <a:srgbClr val="1A1A2E"/>
-                </a:solidFill>
-                <a:latin typeface="Arial"/>
-              </a:defRPr>
-            </a:pPr>
-            <a:r>
-              <a:t>  agent.prompt merges base + runtime context</a:t>
+            </a:pPr>
+            <a:r>
+              <a:rPr sz="1800" b="1">
+                <a:solidFill>
+                  <a:srgbClr val="0088CC"/>
+                </a:solidFill>
+                <a:latin typeface="Arial"/>
+              </a:rPr>
+              <a:t>Lightning Agents</a:t>
+            </a:r>
+            <a:r>
+              <a:rPr sz="1800">
+                <a:solidFill>
+                  <a:srgbClr val="1A1A2E"/>
+                </a:solidFill>
+                <a:latin typeface="Arial"/>
+              </a:rPr>
+              <a:t>: same pattern for AI agents</a:t>
             </a:r>
           </a:p>
           <a:p>
@@ -5247,15 +5500,60 @@
               <a:spcBef>
                 <a:spcPts val="1600"/>
               </a:spcBef>
-              <a:defRPr sz="1800">
-                <a:solidFill>
-                  <a:srgbClr val="1A1A2E"/>
-                </a:solidFill>
-                <a:latin typeface="Arial"/>
-              </a:defRPr>
-            </a:pPr>
-            <a:r>
-              <a:t>  Enables agent reusability across use cases</a:t>
+            </a:pPr>
+            <a:r>
+              <a:rPr sz="1600">
+                <a:solidFill>
+                  <a:srgbClr val="FF6B35"/>
+                </a:solidFill>
+                <a:latin typeface="Consolas"/>
+              </a:rPr>
+              <a:t>architect</a:t>
+            </a:r>
+            <a:r>
+              <a:rPr sz="1800">
+                <a:solidFill>
+                  <a:srgbClr val="1A1A2E"/>
+                </a:solidFill>
+                <a:latin typeface="Arial"/>
+              </a:rPr>
+              <a:t> creates → </a:t>
+            </a:r>
+            <a:r>
+              <a:rPr sz="1600">
+                <a:solidFill>
+                  <a:srgbClr val="FF6B35"/>
+                </a:solidFill>
+                <a:latin typeface="Consolas"/>
+              </a:rPr>
+              <a:t>Registry</a:t>
+            </a:r>
+            <a:r>
+              <a:rPr sz="1800">
+                <a:solidFill>
+                  <a:srgbClr val="1A1A2E"/>
+                </a:solidFill>
+                <a:latin typeface="Arial"/>
+              </a:rPr>
+              <a:t> stores → </a:t>
+            </a:r>
+            <a:r>
+              <a:rPr sz="1600">
+                <a:solidFill>
+                  <a:srgbClr val="FF6B35"/>
+                </a:solidFill>
+                <a:latin typeface="Consolas"/>
+              </a:rPr>
+              <a:t>CLI</a:t>
+            </a:r>
+            <a:r>
+              <a:rPr sz="1800">
+                <a:solidFill>
+                  <a:srgbClr val="1A1A2E"/>
+                </a:solidFill>
+                <a:latin typeface="Arial"/>
+              </a:rPr>
+              <a:t> runs</a:t>
             </a:r>
           </a:p>
         </p:txBody>
@@ -5826,7 +6124,7 @@
               </a:defRPr>
             </a:pPr>
             <a:r>
-              <a:t>Demo Flow</a:t>
+              <a:t>But Wait... Tool Architect Too</a:t>
             </a:r>
           </a:p>
         </p:txBody>
@@ -5857,15 +6155,24 @@
               <a:spcBef>
                 <a:spcPts val="1600"/>
               </a:spcBef>
-              <a:defRPr sz="1800">
-                <a:solidFill>
-                  <a:srgbClr val="1A1A2E"/>
-                </a:solidFill>
-                <a:latin typeface="Arial"/>
-              </a:defRPr>
-            </a:pPr>
-            <a:r>
-              <a:t>  lightning list → Show available agents</a:t>
+            </a:pPr>
+            <a:r>
+              <a:rPr sz="1800">
+                <a:solidFill>
+                  <a:srgbClr val="1A1A2E"/>
+                </a:solidFill>
+                <a:latin typeface="Arial"/>
+              </a:rPr>
+              <a:t>Agents can also design </a:t>
+            </a:r>
+            <a:r>
+              <a:rPr b="1" sz="1800">
+                <a:solidFill>
+                  <a:srgbClr val="0088CC"/>
+                </a:solidFill>
+                <a:latin typeface="Arial"/>
+              </a:rPr>
+              <a:t>NEW TOOLS</a:t>
             </a:r>
           </a:p>
           <a:p>
@@ -5873,15 +6180,33 @@
               <a:spcBef>
                 <a:spcPts val="1600"/>
               </a:spcBef>
-              <a:defRPr sz="1800">
-                <a:solidFill>
-                  <a:srgbClr val="1A1A2E"/>
-                </a:solidFill>
-                <a:latin typeface="Arial"/>
-              </a:defRPr>
-            </a:pPr>
-            <a:r>
-              <a:t>  lightning run lab_finder "RAG tutorials" → Use existing agent</a:t>
+            </a:pPr>
+            <a:r>
+              <a:rPr sz="1600">
+                <a:solidFill>
+                  <a:srgbClr val="FF6B35"/>
+                </a:solidFill>
+                <a:latin typeface="Consolas"/>
+              </a:rPr>
+              <a:t>tool_architect</a:t>
+            </a:r>
+            <a:r>
+              <a:rPr sz="1800">
+                <a:solidFill>
+                  <a:srgbClr val="1A1A2E"/>
+                </a:solidFill>
+                <a:latin typeface="Arial"/>
+              </a:rPr>
+              <a:t> registers definitions in </a:t>
+            </a:r>
+            <a:r>
+              <a:rPr sz="1600">
+                <a:solidFill>
+                  <a:srgbClr val="FF6B35"/>
+                </a:solidFill>
+                <a:latin typeface="Consolas"/>
+              </a:rPr>
+              <a:t>db/tools.json</a:t>
             </a:r>
           </a:p>
           <a:p>
@@ -5889,15 +6214,42 @@
               <a:spcBef>
                 <a:spcPts val="1600"/>
               </a:spcBef>
-              <a:defRPr sz="1800">
-                <a:solidFill>
-                  <a:srgbClr val="1A1A2E"/>
-                </a:solidFill>
-                <a:latin typeface="Arial"/>
-              </a:defRPr>
-            </a:pPr>
-            <a:r>
-              <a:t>  lightning architect "meeting summarizer" → Create NEW agent</a:t>
+            </a:pPr>
+            <a:r>
+              <a:rPr sz="1600">
+                <a:solidFill>
+                  <a:srgbClr val="FF6B35"/>
+                </a:solidFill>
+                <a:latin typeface="Consolas"/>
+              </a:rPr>
+              <a:t>paper_researcher</a:t>
+            </a:r>
+            <a:r>
+              <a:rPr sz="1800">
+                <a:solidFill>
+                  <a:srgbClr val="1A1A2E"/>
+                </a:solidFill>
+                <a:latin typeface="Arial"/>
+              </a:rPr>
+              <a:t> searches papers </a:t>
+            </a:r>
+            <a:r>
+              <a:rPr b="1" sz="1800">
+                <a:solidFill>
+                  <a:srgbClr val="0088CC"/>
+                </a:solidFill>
+                <a:latin typeface="Arial"/>
+              </a:rPr>
+              <a:t>AND</a:t>
+            </a:r>
+            <a:r>
+              <a:rPr sz="1800">
+                <a:solidFill>
+                  <a:srgbClr val="1A1A2E"/>
+                </a:solidFill>
+                <a:latin typeface="Arial"/>
+              </a:rPr>
+              <a:t> downloads PDFs</a:t>
             </a:r>
           </a:p>
           <a:p>
@@ -5905,31 +6257,33 @@
               <a:spcBef>
                 <a:spcPts val="1600"/>
               </a:spcBef>
-              <a:defRPr sz="1800">
-                <a:solidFill>
-                  <a:srgbClr val="1A1A2E"/>
-                </a:solidFill>
-                <a:latin typeface="Arial"/>
-              </a:defRPr>
-            </a:pPr>
-            <a:r>
-              <a:t>  lightning list → New agent now available!</a:t>
-            </a:r>
-          </a:p>
-          <a:p>
-            <a:pPr>
-              <a:spcBef>
-                <a:spcPts val="1600"/>
-              </a:spcBef>
-              <a:defRPr sz="1800">
-                <a:solidFill>
-                  <a:srgbClr val="1A1A2E"/>
-                </a:solidFill>
-                <a:latin typeface="Arial"/>
-              </a:defRPr>
-            </a:pPr>
-            <a:r>
-              <a:t>  lightning run meeting_summarizer "..." → Use it immediately</a:t>
+            </a:pPr>
+            <a:r>
+              <a:rPr sz="1600">
+                <a:solidFill>
+                  <a:srgbClr val="FF6B35"/>
+                </a:solidFill>
+                <a:latin typeface="Consolas"/>
+              </a:rPr>
+              <a:t>presentation_slide_writer</a:t>
+            </a:r>
+            <a:r>
+              <a:rPr sz="1800">
+                <a:solidFill>
+                  <a:srgbClr val="1A1A2E"/>
+                </a:solidFill>
+                <a:latin typeface="Arial"/>
+              </a:rPr>
+              <a:t> manipulates slides </a:t>
+            </a:r>
+            <a:r>
+              <a:rPr b="1" sz="1800">
+                <a:solidFill>
+                  <a:srgbClr val="0088CC"/>
+                </a:solidFill>
+                <a:latin typeface="Arial"/>
+              </a:rPr>
+              <a:t>directly</a:t>
             </a:r>
           </a:p>
         </p:txBody>

</xml_diff>

<commit_message>
fix: improve slides per checker feedback - diagrams, descriptions, flow arrows
- Slide 10: Add tool_architect_flow diagram (was 60% empty)
- Slide 5: Add descriptions under diagram boxes
- Slide 9: Add back_arrow showing self-modifying cycle
- Slide 2: Change title to "Before & After"
- Slide 13: Simplify footer to single repo URL

🤖 Generated with [Claude Code](https://claude.com/claude-code)

Co-Authored-By: Claude <noreply@anthropic.com>
</commit_message>
<xml_diff>
--- a/presentation/output/lightning-agents.pptx
+++ b/presentation/output/lightning-agents.pptx
@@ -3300,160 +3300,456 @@
       </p:sp>
       <p:sp>
         <p:nvSpPr>
-          <p:cNvPr id="3" name="TextBox 2"/>
-          <p:cNvSpPr txBox="1"/>
-          <p:nvPr/>
-        </p:nvSpPr>
-        <p:spPr>
-          <a:xfrm>
-            <a:off x="914400" y="1463040"/>
-            <a:ext cx="10362895" cy="5029200"/>
-          </a:xfrm>
-          <a:prstGeom prst="rect">
-            <a:avLst/>
-          </a:prstGeom>
-          <a:noFill/>
-        </p:spPr>
-        <p:txBody>
-          <a:bodyPr wrap="square">
-            <a:spAutoFit/>
-          </a:bodyPr>
-          <a:lstStyle/>
-          <a:p>
-            <a:pPr>
-              <a:spcBef>
-                <a:spcPts val="1600"/>
-              </a:spcBef>
-            </a:pPr>
-            <a:r>
-              <a:rPr sz="1800">
-                <a:solidFill>
-                  <a:srgbClr val="1A1A2E"/>
+          <p:cNvPr id="3" name="Rounded Rectangle 2"/>
+          <p:cNvSpPr/>
+          <p:nvPr/>
+        </p:nvSpPr>
+        <p:spPr>
+          <a:xfrm>
+            <a:off x="914400" y="2926080"/>
+            <a:ext cx="2011680" cy="1280160"/>
+          </a:xfrm>
+          <a:prstGeom prst="roundRect">
+            <a:avLst/>
+          </a:prstGeom>
+          <a:solidFill>
+            <a:srgbClr val="666666"/>
+          </a:solidFill>
+          <a:ln>
+            <a:solidFill>
+              <a:srgbClr val="666666"/>
+            </a:solidFill>
+          </a:ln>
+        </p:spPr>
+        <p:style>
+          <a:lnRef idx="1">
+            <a:schemeClr val="accent1"/>
+          </a:lnRef>
+          <a:fillRef idx="3">
+            <a:schemeClr val="accent1"/>
+          </a:fillRef>
+          <a:effectRef idx="2">
+            <a:schemeClr val="accent1"/>
+          </a:effectRef>
+          <a:fontRef idx="minor">
+            <a:schemeClr val="lt1"/>
+          </a:fontRef>
+        </p:style>
+        <p:txBody>
+          <a:bodyPr rtlCol="0" anchor="ctr"/>
+          <a:lstStyle/>
+          <a:p>
+            <a:pPr algn="ctr">
+              <a:defRPr sz="1600" b="1">
+                <a:solidFill>
+                  <a:srgbClr val="FFFFFF"/>
                 </a:solidFill>
                 <a:latin typeface="Arial"/>
-              </a:rPr>
-              <a:t>Agents can also design </a:t>
-            </a:r>
-            <a:r>
-              <a:rPr b="1" sz="1800">
-                <a:solidFill>
-                  <a:srgbClr val="0088CC"/>
+              </a:defRPr>
+            </a:pPr>
+            <a:r>
+              <a:t>Tool</a:t>
+            </a:r>
+            <a:br/>
+            <a:r>
+              <a:t>Request</a:t>
+            </a:r>
+          </a:p>
+        </p:txBody>
+      </p:sp>
+      <p:sp>
+        <p:nvSpPr>
+          <p:cNvPr id="4" name="Rounded Rectangle 3"/>
+          <p:cNvSpPr/>
+          <p:nvPr/>
+        </p:nvSpPr>
+        <p:spPr>
+          <a:xfrm>
+            <a:off x="3657600" y="2926080"/>
+            <a:ext cx="2011680" cy="1280160"/>
+          </a:xfrm>
+          <a:prstGeom prst="roundRect">
+            <a:avLst/>
+          </a:prstGeom>
+          <a:solidFill>
+            <a:srgbClr val="FF6B35"/>
+          </a:solidFill>
+          <a:ln>
+            <a:solidFill>
+              <a:srgbClr val="FF6B35"/>
+            </a:solidFill>
+          </a:ln>
+        </p:spPr>
+        <p:style>
+          <a:lnRef idx="1">
+            <a:schemeClr val="accent1"/>
+          </a:lnRef>
+          <a:fillRef idx="3">
+            <a:schemeClr val="accent1"/>
+          </a:fillRef>
+          <a:effectRef idx="2">
+            <a:schemeClr val="accent1"/>
+          </a:effectRef>
+          <a:fontRef idx="minor">
+            <a:schemeClr val="lt1"/>
+          </a:fontRef>
+        </p:style>
+        <p:txBody>
+          <a:bodyPr rtlCol="0" anchor="ctr"/>
+          <a:lstStyle/>
+          <a:p>
+            <a:pPr algn="ctr">
+              <a:defRPr sz="1600" b="1">
+                <a:solidFill>
+                  <a:srgbClr val="FFFFFF"/>
                 </a:solidFill>
                 <a:latin typeface="Arial"/>
-              </a:rPr>
-              <a:t>NEW TOOLS</a:t>
-            </a:r>
-          </a:p>
-          <a:p>
-            <a:pPr>
-              <a:spcBef>
-                <a:spcPts val="1600"/>
-              </a:spcBef>
-            </a:pPr>
-            <a:r>
-              <a:rPr sz="1600">
-                <a:solidFill>
-                  <a:srgbClr val="FF6B35"/>
-                </a:solidFill>
-                <a:latin typeface="Consolas"/>
-              </a:rPr>
+              </a:defRPr>
+            </a:pPr>
+            <a:r>
               <a:t>tool_architect</a:t>
             </a:r>
-            <a:r>
-              <a:rPr sz="1800">
-                <a:solidFill>
-                  <a:srgbClr val="1A1A2E"/>
+          </a:p>
+        </p:txBody>
+      </p:sp>
+      <p:sp>
+        <p:nvSpPr>
+          <p:cNvPr id="5" name="Rounded Rectangle 4"/>
+          <p:cNvSpPr/>
+          <p:nvPr/>
+        </p:nvSpPr>
+        <p:spPr>
+          <a:xfrm>
+            <a:off x="6400800" y="2926080"/>
+            <a:ext cx="2011680" cy="1280160"/>
+          </a:xfrm>
+          <a:prstGeom prst="roundRect">
+            <a:avLst/>
+          </a:prstGeom>
+          <a:solidFill>
+            <a:srgbClr val="0088CC"/>
+          </a:solidFill>
+          <a:ln>
+            <a:solidFill>
+              <a:srgbClr val="0088CC"/>
+            </a:solidFill>
+          </a:ln>
+        </p:spPr>
+        <p:style>
+          <a:lnRef idx="1">
+            <a:schemeClr val="accent1"/>
+          </a:lnRef>
+          <a:fillRef idx="3">
+            <a:schemeClr val="accent1"/>
+          </a:fillRef>
+          <a:effectRef idx="2">
+            <a:schemeClr val="accent1"/>
+          </a:effectRef>
+          <a:fontRef idx="minor">
+            <a:schemeClr val="lt1"/>
+          </a:fontRef>
+        </p:style>
+        <p:txBody>
+          <a:bodyPr rtlCol="0" anchor="ctr"/>
+          <a:lstStyle/>
+          <a:p>
+            <a:pPr algn="ctr">
+              <a:defRPr sz="1600" b="1">
+                <a:solidFill>
+                  <a:srgbClr val="FFFFFF"/>
                 </a:solidFill>
                 <a:latin typeface="Arial"/>
-              </a:rPr>
-              <a:t> registers definitions in </a:t>
-            </a:r>
-            <a:r>
-              <a:rPr sz="1600">
-                <a:solidFill>
-                  <a:srgbClr val="FF6B35"/>
-                </a:solidFill>
-                <a:latin typeface="Consolas"/>
-              </a:rPr>
+              </a:defRPr>
+            </a:pPr>
+            <a:r>
               <a:t>db/tools.json</a:t>
             </a:r>
           </a:p>
-          <a:p>
-            <a:pPr>
-              <a:spcBef>
-                <a:spcPts val="1600"/>
-              </a:spcBef>
-            </a:pPr>
-            <a:r>
-              <a:rPr sz="1600">
-                <a:solidFill>
-                  <a:srgbClr val="FF6B35"/>
-                </a:solidFill>
-                <a:latin typeface="Consolas"/>
-              </a:rPr>
-              <a:t>paper_researcher</a:t>
-            </a:r>
-            <a:r>
-              <a:rPr sz="1800">
-                <a:solidFill>
-                  <a:srgbClr val="1A1A2E"/>
+        </p:txBody>
+      </p:sp>
+      <p:sp>
+        <p:nvSpPr>
+          <p:cNvPr id="6" name="Rounded Rectangle 5"/>
+          <p:cNvSpPr/>
+          <p:nvPr/>
+        </p:nvSpPr>
+        <p:spPr>
+          <a:xfrm>
+            <a:off x="9144000" y="2926080"/>
+            <a:ext cx="2011680" cy="1280160"/>
+          </a:xfrm>
+          <a:prstGeom prst="roundRect">
+            <a:avLst/>
+          </a:prstGeom>
+          <a:solidFill>
+            <a:srgbClr val="FF6B35"/>
+          </a:solidFill>
+          <a:ln>
+            <a:solidFill>
+              <a:srgbClr val="FF6B35"/>
+            </a:solidFill>
+          </a:ln>
+        </p:spPr>
+        <p:style>
+          <a:lnRef idx="1">
+            <a:schemeClr val="accent1"/>
+          </a:lnRef>
+          <a:fillRef idx="3">
+            <a:schemeClr val="accent1"/>
+          </a:fillRef>
+          <a:effectRef idx="2">
+            <a:schemeClr val="accent1"/>
+          </a:effectRef>
+          <a:fontRef idx="minor">
+            <a:schemeClr val="lt1"/>
+          </a:fontRef>
+        </p:style>
+        <p:txBody>
+          <a:bodyPr rtlCol="0" anchor="ctr"/>
+          <a:lstStyle/>
+          <a:p>
+            <a:pPr algn="ctr">
+              <a:defRPr sz="1600" b="1">
+                <a:solidFill>
+                  <a:srgbClr val="FFFFFF"/>
                 </a:solidFill>
                 <a:latin typeface="Arial"/>
-              </a:rPr>
-              <a:t> searches papers </a:t>
-            </a:r>
-            <a:r>
-              <a:rPr b="1" sz="1800">
-                <a:solidFill>
-                  <a:srgbClr val="0088CC"/>
+              </a:defRPr>
+            </a:pPr>
+            <a:r>
+              <a:t>tool_implementer</a:t>
+            </a:r>
+          </a:p>
+        </p:txBody>
+      </p:sp>
+      <p:sp>
+        <p:nvSpPr>
+          <p:cNvPr id="7" name="Rounded Rectangle 6"/>
+          <p:cNvSpPr/>
+          <p:nvPr/>
+        </p:nvSpPr>
+        <p:spPr>
+          <a:xfrm>
+            <a:off x="9144000" y="4754880"/>
+            <a:ext cx="2011680" cy="1280160"/>
+          </a:xfrm>
+          <a:prstGeom prst="roundRect">
+            <a:avLst/>
+          </a:prstGeom>
+          <a:solidFill>
+            <a:srgbClr val="28A745"/>
+          </a:solidFill>
+          <a:ln>
+            <a:solidFill>
+              <a:srgbClr val="28A745"/>
+            </a:solidFill>
+          </a:ln>
+        </p:spPr>
+        <p:style>
+          <a:lnRef idx="1">
+            <a:schemeClr val="accent1"/>
+          </a:lnRef>
+          <a:fillRef idx="3">
+            <a:schemeClr val="accent1"/>
+          </a:fillRef>
+          <a:effectRef idx="2">
+            <a:schemeClr val="accent1"/>
+          </a:effectRef>
+          <a:fontRef idx="minor">
+            <a:schemeClr val="lt1"/>
+          </a:fontRef>
+        </p:style>
+        <p:txBody>
+          <a:bodyPr rtlCol="0" anchor="ctr"/>
+          <a:lstStyle/>
+          <a:p>
+            <a:pPr algn="ctr">
+              <a:defRPr sz="1600" b="1">
+                <a:solidFill>
+                  <a:srgbClr val="FFFFFF"/>
                 </a:solidFill>
                 <a:latin typeface="Arial"/>
-              </a:rPr>
-              <a:t>AND</a:t>
-            </a:r>
-            <a:r>
-              <a:rPr sz="1800">
-                <a:solidFill>
-                  <a:srgbClr val="1A1A2E"/>
-                </a:solidFill>
-                <a:latin typeface="Arial"/>
-              </a:rPr>
-              <a:t> downloads PDFs</a:t>
-            </a:r>
-          </a:p>
-          <a:p>
-            <a:pPr>
-              <a:spcBef>
-                <a:spcPts val="1600"/>
-              </a:spcBef>
-            </a:pPr>
-            <a:r>
-              <a:rPr sz="1600">
-                <a:solidFill>
-                  <a:srgbClr val="FF6B35"/>
-                </a:solidFill>
-                <a:latin typeface="Consolas"/>
-              </a:rPr>
-              <a:t>presentation_slide_writer</a:t>
-            </a:r>
-            <a:r>
-              <a:rPr sz="1800">
-                <a:solidFill>
-                  <a:srgbClr val="1A1A2E"/>
-                </a:solidFill>
-                <a:latin typeface="Arial"/>
-              </a:rPr>
-              <a:t> manipulates slides </a:t>
-            </a:r>
-            <a:r>
-              <a:rPr b="1" sz="1800">
-                <a:solidFill>
-                  <a:srgbClr val="0088CC"/>
-                </a:solidFill>
-                <a:latin typeface="Arial"/>
-              </a:rPr>
-              <a:t>directly</a:t>
-            </a:r>
+              </a:defRPr>
+            </a:pPr>
+            <a:r>
+              <a:t>New Tool</a:t>
+            </a:r>
+            <a:br/>
+            <a:r>
+              <a:t>Available</a:t>
+            </a:r>
+          </a:p>
+        </p:txBody>
+      </p:sp>
+      <p:sp>
+        <p:nvSpPr>
+          <p:cNvPr id="8" name="Down Arrow 7"/>
+          <p:cNvSpPr/>
+          <p:nvPr/>
+        </p:nvSpPr>
+        <p:spPr>
+          <a:xfrm>
+            <a:off x="10012680" y="4297679"/>
+            <a:ext cx="274320" cy="365760"/>
+          </a:xfrm>
+          <a:prstGeom prst="downArrow">
+            <a:avLst/>
+          </a:prstGeom>
+          <a:solidFill>
+            <a:srgbClr val="666666"/>
+          </a:solidFill>
+          <a:ln>
+            <a:noFill/>
+          </a:ln>
+        </p:spPr>
+        <p:style>
+          <a:lnRef idx="1">
+            <a:schemeClr val="accent1"/>
+          </a:lnRef>
+          <a:fillRef idx="3">
+            <a:schemeClr val="accent1"/>
+          </a:fillRef>
+          <a:effectRef idx="2">
+            <a:schemeClr val="accent1"/>
+          </a:effectRef>
+          <a:fontRef idx="minor">
+            <a:schemeClr val="lt1"/>
+          </a:fontRef>
+        </p:style>
+        <p:txBody>
+          <a:bodyPr rtlCol="0" anchor="ctr"/>
+          <a:lstStyle/>
+          <a:p>
+            <a:pPr algn="ctr"/>
+          </a:p>
+        </p:txBody>
+      </p:sp>
+      <p:sp>
+        <p:nvSpPr>
+          <p:cNvPr id="9" name="Right Arrow 8"/>
+          <p:cNvSpPr/>
+          <p:nvPr/>
+        </p:nvSpPr>
+        <p:spPr>
+          <a:xfrm>
+            <a:off x="3017520" y="3429000"/>
+            <a:ext cx="457200" cy="274320"/>
+          </a:xfrm>
+          <a:prstGeom prst="rightArrow">
+            <a:avLst/>
+          </a:prstGeom>
+          <a:solidFill>
+            <a:srgbClr val="666666"/>
+          </a:solidFill>
+          <a:ln>
+            <a:noFill/>
+          </a:ln>
+        </p:spPr>
+        <p:style>
+          <a:lnRef idx="1">
+            <a:schemeClr val="accent1"/>
+          </a:lnRef>
+          <a:fillRef idx="3">
+            <a:schemeClr val="accent1"/>
+          </a:fillRef>
+          <a:effectRef idx="2">
+            <a:schemeClr val="accent1"/>
+          </a:effectRef>
+          <a:fontRef idx="minor">
+            <a:schemeClr val="lt1"/>
+          </a:fontRef>
+        </p:style>
+        <p:txBody>
+          <a:bodyPr rtlCol="0" anchor="ctr"/>
+          <a:lstStyle/>
+          <a:p>
+            <a:pPr algn="ctr"/>
+          </a:p>
+        </p:txBody>
+      </p:sp>
+      <p:sp>
+        <p:nvSpPr>
+          <p:cNvPr id="10" name="Right Arrow 9"/>
+          <p:cNvSpPr/>
+          <p:nvPr/>
+        </p:nvSpPr>
+        <p:spPr>
+          <a:xfrm>
+            <a:off x="5760720" y="3429000"/>
+            <a:ext cx="457200" cy="274320"/>
+          </a:xfrm>
+          <a:prstGeom prst="rightArrow">
+            <a:avLst/>
+          </a:prstGeom>
+          <a:solidFill>
+            <a:srgbClr val="666666"/>
+          </a:solidFill>
+          <a:ln>
+            <a:noFill/>
+          </a:ln>
+        </p:spPr>
+        <p:style>
+          <a:lnRef idx="1">
+            <a:schemeClr val="accent1"/>
+          </a:lnRef>
+          <a:fillRef idx="3">
+            <a:schemeClr val="accent1"/>
+          </a:fillRef>
+          <a:effectRef idx="2">
+            <a:schemeClr val="accent1"/>
+          </a:effectRef>
+          <a:fontRef idx="minor">
+            <a:schemeClr val="lt1"/>
+          </a:fontRef>
+        </p:style>
+        <p:txBody>
+          <a:bodyPr rtlCol="0" anchor="ctr"/>
+          <a:lstStyle/>
+          <a:p>
+            <a:pPr algn="ctr"/>
+          </a:p>
+        </p:txBody>
+      </p:sp>
+      <p:sp>
+        <p:nvSpPr>
+          <p:cNvPr id="11" name="Right Arrow 10"/>
+          <p:cNvSpPr/>
+          <p:nvPr/>
+        </p:nvSpPr>
+        <p:spPr>
+          <a:xfrm>
+            <a:off x="8503920" y="3429000"/>
+            <a:ext cx="457200" cy="274320"/>
+          </a:xfrm>
+          <a:prstGeom prst="rightArrow">
+            <a:avLst/>
+          </a:prstGeom>
+          <a:solidFill>
+            <a:srgbClr val="666666"/>
+          </a:solidFill>
+          <a:ln>
+            <a:noFill/>
+          </a:ln>
+        </p:spPr>
+        <p:style>
+          <a:lnRef idx="1">
+            <a:schemeClr val="accent1"/>
+          </a:lnRef>
+          <a:fillRef idx="3">
+            <a:schemeClr val="accent1"/>
+          </a:fillRef>
+          <a:effectRef idx="2">
+            <a:schemeClr val="accent1"/>
+          </a:effectRef>
+          <a:fontRef idx="minor">
+            <a:schemeClr val="lt1"/>
+          </a:fontRef>
+        </p:style>
+        <p:txBody>
+          <a:bodyPr rtlCol="0" anchor="ctr"/>
+          <a:lstStyle/>
+          <a:p>
+            <a:pPr algn="ctr"/>
           </a:p>
         </p:txBody>
       </p:sp>
@@ -4172,7 +4468,7 @@
               </a:defRPr>
             </a:pPr>
             <a:r>
-              <a:t>github.com/RPirruccio/lightning-agents | aimug.org</a:t>
+              <a:t>github.com/RPirruccio/lightning-agents</a:t>
             </a:r>
           </a:p>
         </p:txBody>
@@ -4226,7 +4522,7 @@
               </a:defRPr>
             </a:pPr>
             <a:r>
-              <a:t>The Problem</a:t>
+              <a:t>Before &amp; After</a:t>
             </a:r>
           </a:p>
         </p:txBody>
@@ -6023,7 +6319,7 @@
         </p:nvSpPr>
         <p:spPr>
           <a:xfrm>
-            <a:off x="1371600" y="2926080"/>
+            <a:off x="1371600" y="2377440"/>
             <a:ext cx="2011680" cy="1280160"/>
           </a:xfrm>
           <a:prstGeom prst="roundRect">
@@ -6065,24 +6361,56 @@
               </a:defRPr>
             </a:pPr>
             <a:r>
-              <a:t>Definition</a:t>
-            </a:r>
-            <a:br/>
-            <a:r>
-              <a:t>(JSON)</a:t>
-            </a:r>
-          </a:p>
-        </p:txBody>
-      </p:sp>
-      <p:sp>
-        <p:nvSpPr>
-          <p:cNvPr id="4" name="Rounded Rectangle 3"/>
+              <a:t>agents.json</a:t>
+            </a:r>
+          </a:p>
+        </p:txBody>
+      </p:sp>
+      <p:sp>
+        <p:nvSpPr>
+          <p:cNvPr id="4" name="TextBox 3"/>
+          <p:cNvSpPr txBox="1"/>
+          <p:nvPr/>
+        </p:nvSpPr>
+        <p:spPr>
+          <a:xfrm>
+            <a:off x="1188720" y="3749039"/>
+            <a:ext cx="2377440" cy="457200"/>
+          </a:xfrm>
+          <a:prstGeom prst="rect">
+            <a:avLst/>
+          </a:prstGeom>
+          <a:noFill/>
+        </p:spPr>
+        <p:txBody>
+          <a:bodyPr wrap="none">
+            <a:spAutoFit/>
+          </a:bodyPr>
+          <a:lstStyle/>
+          <a:p>
+            <a:pPr algn="ctr">
+              <a:defRPr sz="1000">
+                <a:solidFill>
+                  <a:srgbClr val="666666"/>
+                </a:solidFill>
+                <a:latin typeface="Arial"/>
+              </a:defRPr>
+            </a:pPr>
+            <a:r>
+              <a:t>Single source of truth</a:t>
+            </a:r>
+          </a:p>
+        </p:txBody>
+      </p:sp>
+      <p:sp>
+        <p:nvSpPr>
+          <p:cNvPr id="5" name="Rounded Rectangle 4"/>
           <p:cNvSpPr/>
           <p:nvPr/>
         </p:nvSpPr>
         <p:spPr>
           <a:xfrm>
-            <a:off x="4114800" y="2926080"/>
+            <a:off x="4114800" y="2377440"/>
             <a:ext cx="2011680" cy="1280160"/>
           </a:xfrm>
           <a:prstGeom prst="roundRect">
@@ -6124,24 +6452,56 @@
               </a:defRPr>
             </a:pPr>
             <a:r>
-              <a:t>Factory</a:t>
-            </a:r>
-            <a:br/>
-            <a:r>
-              <a:t>(Callable)</a:t>
-            </a:r>
-          </a:p>
-        </p:txBody>
-      </p:sp>
-      <p:sp>
-        <p:nvSpPr>
-          <p:cNvPr id="5" name="Rounded Rectangle 4"/>
+              <a:t>Definition</a:t>
+            </a:r>
+          </a:p>
+        </p:txBody>
+      </p:sp>
+      <p:sp>
+        <p:nvSpPr>
+          <p:cNvPr id="6" name="TextBox 5"/>
+          <p:cNvSpPr txBox="1"/>
+          <p:nvPr/>
+        </p:nvSpPr>
+        <p:spPr>
+          <a:xfrm>
+            <a:off x="3931920" y="3749039"/>
+            <a:ext cx="2377440" cy="457200"/>
+          </a:xfrm>
+          <a:prstGeom prst="rect">
+            <a:avLst/>
+          </a:prstGeom>
+          <a:noFill/>
+        </p:spPr>
+        <p:txBody>
+          <a:bodyPr wrap="none">
+            <a:spAutoFit/>
+          </a:bodyPr>
+          <a:lstStyle/>
+          <a:p>
+            <a:pPr algn="ctr">
+              <a:defRPr sz="1000">
+                <a:solidFill>
+                  <a:srgbClr val="666666"/>
+                </a:solidFill>
+                <a:latin typeface="Arial"/>
+              </a:defRPr>
+            </a:pPr>
+            <a:r>
+              <a:t>JSON with prompt, model, tools</a:t>
+            </a:r>
+          </a:p>
+        </p:txBody>
+      </p:sp>
+      <p:sp>
+        <p:nvSpPr>
+          <p:cNvPr id="7" name="Rounded Rectangle 6"/>
           <p:cNvSpPr/>
           <p:nvPr/>
         </p:nvSpPr>
         <p:spPr>
           <a:xfrm>
-            <a:off x="6858000" y="2926080"/>
+            <a:off x="6858000" y="2377440"/>
             <a:ext cx="2011680" cy="1280160"/>
           </a:xfrm>
           <a:prstGeom prst="roundRect">
@@ -6183,24 +6543,56 @@
               </a:defRPr>
             </a:pPr>
             <a:r>
-              <a:t>Registry</a:t>
-            </a:r>
-            <a:br/>
-            <a:r>
-              <a:t>(Unified)</a:t>
-            </a:r>
-          </a:p>
-        </p:txBody>
-      </p:sp>
-      <p:sp>
-        <p:nvSpPr>
-          <p:cNvPr id="6" name="Rounded Rectangle 5"/>
+              <a:t>Factory</a:t>
+            </a:r>
+          </a:p>
+        </p:txBody>
+      </p:sp>
+      <p:sp>
+        <p:nvSpPr>
+          <p:cNvPr id="8" name="TextBox 7"/>
+          <p:cNvSpPr txBox="1"/>
+          <p:nvPr/>
+        </p:nvSpPr>
+        <p:spPr>
+          <a:xfrm>
+            <a:off x="6675120" y="3749039"/>
+            <a:ext cx="2377440" cy="457200"/>
+          </a:xfrm>
+          <a:prstGeom prst="rect">
+            <a:avLst/>
+          </a:prstGeom>
+          <a:noFill/>
+        </p:spPr>
+        <p:txBody>
+          <a:bodyPr wrap="none">
+            <a:spAutoFit/>
+          </a:bodyPr>
+          <a:lstStyle/>
+          <a:p>
+            <a:pPr algn="ctr">
+              <a:defRPr sz="1000">
+                <a:solidFill>
+                  <a:srgbClr val="666666"/>
+                </a:solidFill>
+                <a:latin typeface="Arial"/>
+              </a:defRPr>
+            </a:pPr>
+            <a:r>
+              <a:t>Creates configured instances</a:t>
+            </a:r>
+          </a:p>
+        </p:txBody>
+      </p:sp>
+      <p:sp>
+        <p:nvSpPr>
+          <p:cNvPr id="9" name="Rounded Rectangle 8"/>
           <p:cNvSpPr/>
           <p:nvPr/>
         </p:nvSpPr>
         <p:spPr>
           <a:xfrm>
-            <a:off x="9601200" y="2926080"/>
+            <a:off x="9601200" y="2377440"/>
             <a:ext cx="2011680" cy="1280160"/>
           </a:xfrm>
           <a:prstGeom prst="roundRect">
@@ -6244,22 +6636,54 @@
             <a:r>
               <a:t>Instance</a:t>
             </a:r>
-            <a:br/>
-            <a:r>
-              <a:t>(Ready)</a:t>
-            </a:r>
-          </a:p>
-        </p:txBody>
-      </p:sp>
-      <p:sp>
-        <p:nvSpPr>
-          <p:cNvPr id="7" name="Right Arrow 6"/>
+          </a:p>
+        </p:txBody>
+      </p:sp>
+      <p:sp>
+        <p:nvSpPr>
+          <p:cNvPr id="10" name="TextBox 9"/>
+          <p:cNvSpPr txBox="1"/>
+          <p:nvPr/>
+        </p:nvSpPr>
+        <p:spPr>
+          <a:xfrm>
+            <a:off x="9418320" y="3749039"/>
+            <a:ext cx="2377440" cy="457200"/>
+          </a:xfrm>
+          <a:prstGeom prst="rect">
+            <a:avLst/>
+          </a:prstGeom>
+          <a:noFill/>
+        </p:spPr>
+        <p:txBody>
+          <a:bodyPr wrap="none">
+            <a:spAutoFit/>
+          </a:bodyPr>
+          <a:lstStyle/>
+          <a:p>
+            <a:pPr algn="ctr">
+              <a:defRPr sz="1000">
+                <a:solidFill>
+                  <a:srgbClr val="666666"/>
+                </a:solidFill>
+                <a:latin typeface="Arial"/>
+              </a:defRPr>
+            </a:pPr>
+            <a:r>
+              <a:t>Ready to run with context</a:t>
+            </a:r>
+          </a:p>
+        </p:txBody>
+      </p:sp>
+      <p:sp>
+        <p:nvSpPr>
+          <p:cNvPr id="11" name="Right Arrow 10"/>
           <p:cNvSpPr/>
           <p:nvPr/>
         </p:nvSpPr>
         <p:spPr>
           <a:xfrm>
-            <a:off x="3474720" y="3429000"/>
+            <a:off x="3474720" y="2880360"/>
             <a:ext cx="457200" cy="274320"/>
           </a:xfrm>
           <a:prstGeom prst="rightArrow">
@@ -6296,13 +6720,13 @@
       </p:sp>
       <p:sp>
         <p:nvSpPr>
-          <p:cNvPr id="8" name="Right Arrow 7"/>
+          <p:cNvPr id="12" name="Right Arrow 11"/>
           <p:cNvSpPr/>
           <p:nvPr/>
         </p:nvSpPr>
         <p:spPr>
           <a:xfrm>
-            <a:off x="6217920" y="3429000"/>
+            <a:off x="6217920" y="2880360"/>
             <a:ext cx="457200" cy="274320"/>
           </a:xfrm>
           <a:prstGeom prst="rightArrow">
@@ -6339,13 +6763,13 @@
       </p:sp>
       <p:sp>
         <p:nvSpPr>
-          <p:cNvPr id="9" name="Right Arrow 8"/>
+          <p:cNvPr id="13" name="Right Arrow 12"/>
           <p:cNvSpPr/>
           <p:nvPr/>
         </p:nvSpPr>
         <p:spPr>
           <a:xfrm>
-            <a:off x="8961120" y="3429000"/>
+            <a:off x="8961120" y="2880360"/>
             <a:ext cx="457200" cy="274320"/>
           </a:xfrm>
           <a:prstGeom prst="rightArrow">
@@ -7856,6 +8280,49 @@
           </a:prstGeom>
           <a:solidFill>
             <a:srgbClr val="666666"/>
+          </a:solidFill>
+          <a:ln>
+            <a:noFill/>
+          </a:ln>
+        </p:spPr>
+        <p:style>
+          <a:lnRef idx="1">
+            <a:schemeClr val="accent1"/>
+          </a:lnRef>
+          <a:fillRef idx="3">
+            <a:schemeClr val="accent1"/>
+          </a:fillRef>
+          <a:effectRef idx="2">
+            <a:schemeClr val="accent1"/>
+          </a:effectRef>
+          <a:fontRef idx="minor">
+            <a:schemeClr val="lt1"/>
+          </a:fontRef>
+        </p:style>
+        <p:txBody>
+          <a:bodyPr rtlCol="0" anchor="ctr"/>
+          <a:lstStyle/>
+          <a:p>
+            <a:pPr algn="ctr"/>
+          </a:p>
+        </p:txBody>
+      </p:sp>
+      <p:sp>
+        <p:nvSpPr>
+          <p:cNvPr id="12" name="Down Arrow 11"/>
+          <p:cNvSpPr/>
+          <p:nvPr/>
+        </p:nvSpPr>
+        <p:spPr>
+          <a:xfrm>
+            <a:off x="8641080" y="3657600"/>
+            <a:ext cx="274320" cy="640080"/>
+          </a:xfrm>
+          <a:prstGeom prst="downArrow">
+            <a:avLst/>
+          </a:prstGeom>
+          <a:solidFill>
+            <a:srgbClr val="FF6B35"/>
           </a:solidFill>
           <a:ln>
             <a:noFill/>

</xml_diff>

<commit_message>
feat(slides): overhaul architect diagrams with feedback loops and visual hierarchy
Slides 9 & 10 now show the "meta moment" of self-modifying agents:
- Architect Agent as visual hero (1.5x size) with subtitle
- Feedback loops showing agents can create more agents
- Arrow labels explaining each step of the flow
- Meta callout footers posing the recursive question
- Tool Architect with agent labels and document shape for db/tools.json

🤖 Generated with [Claude Code](https://claude.com/claude-code)

Co-Authored-By: Claude <noreply@anthropic.com>
</commit_message>
<xml_diff>
--- a/presentation/output/lightning-agents.pptx
+++ b/presentation/output/lightning-agents.pptx
@@ -3306,7 +3306,7 @@
         </p:nvSpPr>
         <p:spPr>
           <a:xfrm>
-            <a:off x="914400" y="2926080"/>
+            <a:off x="457200" y="2560320"/>
             <a:ext cx="2011680" cy="1280160"/>
           </a:xfrm>
           <a:prstGeom prst="roundRect">
@@ -3365,7 +3365,7 @@
         </p:nvSpPr>
         <p:spPr>
           <a:xfrm>
-            <a:off x="3657600" y="2926080"/>
+            <a:off x="3017520" y="2560320"/>
             <a:ext cx="2011680" cy="1280160"/>
           </a:xfrm>
           <a:prstGeom prst="roundRect">
@@ -3414,16 +3414,52 @@
       </p:sp>
       <p:sp>
         <p:nvSpPr>
-          <p:cNvPr id="5" name="Rounded Rectangle 4"/>
+          <p:cNvPr id="5" name="TextBox 4"/>
+          <p:cNvSpPr txBox="1"/>
+          <p:nvPr/>
+        </p:nvSpPr>
+        <p:spPr>
+          <a:xfrm>
+            <a:off x="2743200" y="3886199"/>
+            <a:ext cx="2560320" cy="457200"/>
+          </a:xfrm>
+          <a:prstGeom prst="rect">
+            <a:avLst/>
+          </a:prstGeom>
+          <a:noFill/>
+        </p:spPr>
+        <p:txBody>
+          <a:bodyPr wrap="none">
+            <a:spAutoFit/>
+          </a:bodyPr>
+          <a:lstStyle/>
+          <a:p>
+            <a:pPr algn="ctr">
+              <a:defRPr sz="1000">
+                <a:solidFill>
+                  <a:srgbClr val="FF6B35"/>
+                </a:solidFill>
+                <a:latin typeface="Arial"/>
+              </a:defRPr>
+            </a:pPr>
+            <a:r>
+              <a:t>🤖 Agent</a:t>
+            </a:r>
+          </a:p>
+        </p:txBody>
+      </p:sp>
+      <p:sp>
+        <p:nvSpPr>
+          <p:cNvPr id="6" name="Document 5"/>
           <p:cNvSpPr/>
           <p:nvPr/>
         </p:nvSpPr>
         <p:spPr>
           <a:xfrm>
-            <a:off x="6400800" y="2926080"/>
+            <a:off x="5577840" y="2560320"/>
             <a:ext cx="2011680" cy="1280160"/>
           </a:xfrm>
-          <a:prstGeom prst="roundRect">
+          <a:prstGeom prst="flowChartDocument">
             <a:avLst/>
           </a:prstGeom>
           <a:solidFill>
@@ -3462,20 +3498,20 @@
               </a:defRPr>
             </a:pPr>
             <a:r>
-              <a:t>db/tools.json</a:t>
-            </a:r>
-          </a:p>
-        </p:txBody>
-      </p:sp>
-      <p:sp>
-        <p:nvSpPr>
-          <p:cNvPr id="6" name="Rounded Rectangle 5"/>
+              <a:t>📁 db/tools.json</a:t>
+            </a:r>
+          </a:p>
+        </p:txBody>
+      </p:sp>
+      <p:sp>
+        <p:nvSpPr>
+          <p:cNvPr id="7" name="Rounded Rectangle 6"/>
           <p:cNvSpPr/>
           <p:nvPr/>
         </p:nvSpPr>
         <p:spPr>
           <a:xfrm>
-            <a:off x="9144000" y="2926080"/>
+            <a:off x="8138160" y="2560320"/>
             <a:ext cx="2011680" cy="1280160"/>
           </a:xfrm>
           <a:prstGeom prst="roundRect">
@@ -3524,13 +3560,49 @@
       </p:sp>
       <p:sp>
         <p:nvSpPr>
-          <p:cNvPr id="7" name="Rounded Rectangle 6"/>
+          <p:cNvPr id="8" name="TextBox 7"/>
+          <p:cNvSpPr txBox="1"/>
+          <p:nvPr/>
+        </p:nvSpPr>
+        <p:spPr>
+          <a:xfrm>
+            <a:off x="7863840" y="3886199"/>
+            <a:ext cx="2560320" cy="457200"/>
+          </a:xfrm>
+          <a:prstGeom prst="rect">
+            <a:avLst/>
+          </a:prstGeom>
+          <a:noFill/>
+        </p:spPr>
+        <p:txBody>
+          <a:bodyPr wrap="none">
+            <a:spAutoFit/>
+          </a:bodyPr>
+          <a:lstStyle/>
+          <a:p>
+            <a:pPr algn="ctr">
+              <a:defRPr sz="1000">
+                <a:solidFill>
+                  <a:srgbClr val="FF6B35"/>
+                </a:solidFill>
+                <a:latin typeface="Arial"/>
+              </a:defRPr>
+            </a:pPr>
+            <a:r>
+              <a:t>🤖 Agent</a:t>
+            </a:r>
+          </a:p>
+        </p:txBody>
+      </p:sp>
+      <p:sp>
+        <p:nvSpPr>
+          <p:cNvPr id="9" name="Rounded Rectangle 8"/>
           <p:cNvSpPr/>
           <p:nvPr/>
         </p:nvSpPr>
         <p:spPr>
           <a:xfrm>
-            <a:off x="9144000" y="4754880"/>
+            <a:off x="8138160" y="4754880"/>
             <a:ext cx="2011680" cy="1280160"/>
           </a:xfrm>
           <a:prstGeom prst="roundRect">
@@ -3583,14 +3655,14 @@
       </p:sp>
       <p:sp>
         <p:nvSpPr>
-          <p:cNvPr id="8" name="Down Arrow 7"/>
+          <p:cNvPr id="10" name="Down Arrow 9"/>
           <p:cNvSpPr/>
           <p:nvPr/>
         </p:nvSpPr>
         <p:spPr>
           <a:xfrm>
-            <a:off x="10012680" y="4297679"/>
-            <a:ext cx="274320" cy="365760"/>
+            <a:off x="9006840" y="3931919"/>
+            <a:ext cx="274320" cy="731520"/>
           </a:xfrm>
           <a:prstGeom prst="downArrow">
             <a:avLst/>
@@ -3626,14 +3698,49 @@
       </p:sp>
       <p:sp>
         <p:nvSpPr>
-          <p:cNvPr id="9" name="Right Arrow 8"/>
+          <p:cNvPr id="11" name="TextBox 10"/>
+          <p:cNvSpPr txBox="1"/>
+          <p:nvPr/>
+        </p:nvSpPr>
+        <p:spPr>
+          <a:xfrm>
+            <a:off x="9326880" y="4114799"/>
+            <a:ext cx="1371600" cy="365760"/>
+          </a:xfrm>
+          <a:prstGeom prst="rect">
+            <a:avLst/>
+          </a:prstGeom>
+          <a:noFill/>
+        </p:spPr>
+        <p:txBody>
+          <a:bodyPr wrap="none">
+            <a:spAutoFit/>
+          </a:bodyPr>
+          <a:lstStyle/>
+          <a:p>
+            <a:pPr>
+              <a:defRPr sz="900" i="1">
+                <a:solidFill>
+                  <a:srgbClr val="666666"/>
+                </a:solidFill>
+              </a:defRPr>
+            </a:pPr>
+            <a:r>
+              <a:t>Tests &amp; deploys</a:t>
+            </a:r>
+          </a:p>
+        </p:txBody>
+      </p:sp>
+      <p:sp>
+        <p:nvSpPr>
+          <p:cNvPr id="12" name="Right Arrow 11"/>
           <p:cNvSpPr/>
           <p:nvPr/>
         </p:nvSpPr>
         <p:spPr>
           <a:xfrm>
-            <a:off x="3017520" y="3429000"/>
-            <a:ext cx="457200" cy="274320"/>
+            <a:off x="2560320" y="3063240"/>
+            <a:ext cx="365759" cy="274320"/>
           </a:xfrm>
           <a:prstGeom prst="rightArrow">
             <a:avLst/>
@@ -3669,14 +3776,49 @@
       </p:sp>
       <p:sp>
         <p:nvSpPr>
-          <p:cNvPr id="10" name="Right Arrow 9"/>
+          <p:cNvPr id="13" name="TextBox 12"/>
+          <p:cNvSpPr txBox="1"/>
+          <p:nvPr/>
+        </p:nvSpPr>
+        <p:spPr>
+          <a:xfrm>
+            <a:off x="2286000" y="2743200"/>
+            <a:ext cx="1097280" cy="274320"/>
+          </a:xfrm>
+          <a:prstGeom prst="rect">
+            <a:avLst/>
+          </a:prstGeom>
+          <a:noFill/>
+        </p:spPr>
+        <p:txBody>
+          <a:bodyPr wrap="none">
+            <a:spAutoFit/>
+          </a:bodyPr>
+          <a:lstStyle/>
+          <a:p>
+            <a:pPr algn="ctr">
+              <a:defRPr sz="900" i="1">
+                <a:solidFill>
+                  <a:srgbClr val="666666"/>
+                </a:solidFill>
+              </a:defRPr>
+            </a:pPr>
+            <a:r>
+              <a:t>Designs spec</a:t>
+            </a:r>
+          </a:p>
+        </p:txBody>
+      </p:sp>
+      <p:sp>
+        <p:nvSpPr>
+          <p:cNvPr id="14" name="Right Arrow 13"/>
           <p:cNvSpPr/>
           <p:nvPr/>
         </p:nvSpPr>
         <p:spPr>
           <a:xfrm>
-            <a:off x="5760720" y="3429000"/>
-            <a:ext cx="457200" cy="274320"/>
+            <a:off x="5120640" y="3063240"/>
+            <a:ext cx="365759" cy="274320"/>
           </a:xfrm>
           <a:prstGeom prst="rightArrow">
             <a:avLst/>
@@ -3712,14 +3854,49 @@
       </p:sp>
       <p:sp>
         <p:nvSpPr>
-          <p:cNvPr id="11" name="Right Arrow 10"/>
+          <p:cNvPr id="15" name="TextBox 14"/>
+          <p:cNvSpPr txBox="1"/>
+          <p:nvPr/>
+        </p:nvSpPr>
+        <p:spPr>
+          <a:xfrm>
+            <a:off x="4846320" y="2743200"/>
+            <a:ext cx="1097280" cy="274320"/>
+          </a:xfrm>
+          <a:prstGeom prst="rect">
+            <a:avLst/>
+          </a:prstGeom>
+          <a:noFill/>
+        </p:spPr>
+        <p:txBody>
+          <a:bodyPr wrap="none">
+            <a:spAutoFit/>
+          </a:bodyPr>
+          <a:lstStyle/>
+          <a:p>
+            <a:pPr algn="ctr">
+              <a:defRPr sz="900" i="1">
+                <a:solidFill>
+                  <a:srgbClr val="666666"/>
+                </a:solidFill>
+              </a:defRPr>
+            </a:pPr>
+            <a:r>
+              <a:t>Persists</a:t>
+            </a:r>
+          </a:p>
+        </p:txBody>
+      </p:sp>
+      <p:sp>
+        <p:nvSpPr>
+          <p:cNvPr id="16" name="Right Arrow 15"/>
           <p:cNvSpPr/>
           <p:nvPr/>
         </p:nvSpPr>
         <p:spPr>
           <a:xfrm>
-            <a:off x="8503920" y="3429000"/>
-            <a:ext cx="457200" cy="274320"/>
+            <a:off x="7680960" y="3063240"/>
+            <a:ext cx="365760" cy="274320"/>
           </a:xfrm>
           <a:prstGeom prst="rightArrow">
             <a:avLst/>
@@ -3750,6 +3927,158 @@
           <a:lstStyle/>
           <a:p>
             <a:pPr algn="ctr"/>
+          </a:p>
+        </p:txBody>
+      </p:sp>
+      <p:sp>
+        <p:nvSpPr>
+          <p:cNvPr id="17" name="TextBox 16"/>
+          <p:cNvSpPr txBox="1"/>
+          <p:nvPr/>
+        </p:nvSpPr>
+        <p:spPr>
+          <a:xfrm>
+            <a:off x="7406640" y="2743200"/>
+            <a:ext cx="1097280" cy="274320"/>
+          </a:xfrm>
+          <a:prstGeom prst="rect">
+            <a:avLst/>
+          </a:prstGeom>
+          <a:noFill/>
+        </p:spPr>
+        <p:txBody>
+          <a:bodyPr wrap="none">
+            <a:spAutoFit/>
+          </a:bodyPr>
+          <a:lstStyle/>
+          <a:p>
+            <a:pPr algn="ctr">
+              <a:defRPr sz="900" i="1">
+                <a:solidFill>
+                  <a:srgbClr val="666666"/>
+                </a:solidFill>
+              </a:defRPr>
+            </a:pPr>
+            <a:r>
+              <a:t>Implements</a:t>
+            </a:r>
+          </a:p>
+        </p:txBody>
+      </p:sp>
+      <p:sp>
+        <p:nvSpPr>
+          <p:cNvPr id="18" name="Curved Left Arrow 17"/>
+          <p:cNvSpPr/>
+          <p:nvPr/>
+        </p:nvSpPr>
+        <p:spPr>
+          <a:xfrm>
+            <a:off x="7406640" y="5029200"/>
+            <a:ext cx="640080" cy="731520"/>
+          </a:xfrm>
+          <a:prstGeom prst="curvedLeftArrow">
+            <a:avLst/>
+          </a:prstGeom>
+          <a:solidFill>
+            <a:srgbClr val="28A745"/>
+          </a:solidFill>
+          <a:ln>
+            <a:noFill/>
+          </a:ln>
+        </p:spPr>
+        <p:style>
+          <a:lnRef idx="1">
+            <a:schemeClr val="accent1"/>
+          </a:lnRef>
+          <a:fillRef idx="3">
+            <a:schemeClr val="accent1"/>
+          </a:fillRef>
+          <a:effectRef idx="2">
+            <a:schemeClr val="accent1"/>
+          </a:effectRef>
+          <a:fontRef idx="minor">
+            <a:schemeClr val="lt1"/>
+          </a:fontRef>
+        </p:style>
+        <p:txBody>
+          <a:bodyPr rtlCol="0" anchor="ctr"/>
+          <a:lstStyle/>
+          <a:p>
+            <a:pPr algn="ctr"/>
+          </a:p>
+        </p:txBody>
+      </p:sp>
+      <p:sp>
+        <p:nvSpPr>
+          <p:cNvPr id="19" name="TextBox 18"/>
+          <p:cNvSpPr txBox="1"/>
+          <p:nvPr/>
+        </p:nvSpPr>
+        <p:spPr>
+          <a:xfrm>
+            <a:off x="6126480" y="5029200"/>
+            <a:ext cx="1280160" cy="731520"/>
+          </a:xfrm>
+          <a:prstGeom prst="rect">
+            <a:avLst/>
+          </a:prstGeom>
+          <a:noFill/>
+        </p:spPr>
+        <p:txBody>
+          <a:bodyPr wrap="none">
+            <a:spAutoFit/>
+          </a:bodyPr>
+          <a:lstStyle/>
+          <a:p>
+            <a:pPr algn="ctr">
+              <a:defRPr sz="1000" b="1">
+                <a:solidFill>
+                  <a:srgbClr val="28A745"/>
+                </a:solidFill>
+              </a:defRPr>
+            </a:pPr>
+            <a:r>
+              <a:t>Now available</a:t>
+            </a:r>
+            <a:br/>
+            <a:r>
+              <a:t>system-wide</a:t>
+            </a:r>
+          </a:p>
+        </p:txBody>
+      </p:sp>
+      <p:sp>
+        <p:nvSpPr>
+          <p:cNvPr id="20" name="TextBox 19"/>
+          <p:cNvSpPr txBox="1"/>
+          <p:nvPr/>
+        </p:nvSpPr>
+        <p:spPr>
+          <a:xfrm>
+            <a:off x="457200" y="5943600"/>
+            <a:ext cx="11277295" cy="548640"/>
+          </a:xfrm>
+          <a:prstGeom prst="rect">
+            <a:avLst/>
+          </a:prstGeom>
+          <a:noFill/>
+        </p:spPr>
+        <p:txBody>
+          <a:bodyPr wrap="none">
+            <a:spAutoFit/>
+          </a:bodyPr>
+          <a:lstStyle/>
+          <a:p>
+            <a:pPr algn="ctr">
+              <a:defRPr sz="1800" b="1">
+                <a:solidFill>
+                  <a:srgbClr val="0088CC"/>
+                </a:solidFill>
+              </a:defRPr>
+            </a:pPr>
+            <a:r>
+              <a:t>🤯 Agents creating tools for other agents to use</a:t>
+            </a:r>
           </a:p>
         </p:txBody>
       </p:sp>
@@ -6684,7 +7013,7 @@
         <p:spPr>
           <a:xfrm>
             <a:off x="3474720" y="2880360"/>
-            <a:ext cx="457200" cy="274320"/>
+            <a:ext cx="548639" cy="274320"/>
           </a:xfrm>
           <a:prstGeom prst="rightArrow">
             <a:avLst/>
@@ -6727,7 +7056,7 @@
         <p:spPr>
           <a:xfrm>
             <a:off x="6217920" y="2880360"/>
-            <a:ext cx="457200" cy="274320"/>
+            <a:ext cx="548639" cy="274320"/>
           </a:xfrm>
           <a:prstGeom prst="rightArrow">
             <a:avLst/>
@@ -6769,8 +7098,8 @@
         </p:nvSpPr>
         <p:spPr>
           <a:xfrm>
-            <a:off x="8961120" y="2880360"/>
-            <a:ext cx="457200" cy="274320"/>
+            <a:off x="8961119" y="2880360"/>
+            <a:ext cx="548639" cy="274320"/>
           </a:xfrm>
           <a:prstGeom prst="rightArrow">
             <a:avLst/>
@@ -7852,7 +8181,7 @@
         </p:nvSpPr>
         <p:spPr>
           <a:xfrm>
-            <a:off x="1371600" y="2286000"/>
+            <a:off x="731520" y="2011680"/>
             <a:ext cx="2011680" cy="1280160"/>
           </a:xfrm>
           <a:prstGeom prst="roundRect">
@@ -7911,8 +8240,8 @@
         </p:nvSpPr>
         <p:spPr>
           <a:xfrm>
-            <a:off x="4572000" y="2286000"/>
-            <a:ext cx="2011680" cy="1280160"/>
+            <a:off x="3474720" y="1645920"/>
+            <a:ext cx="3017520" cy="1828800"/>
           </a:xfrm>
           <a:prstGeom prst="roundRect">
             <a:avLst/>
@@ -7945,7 +8274,7 @@
           <a:lstStyle/>
           <a:p>
             <a:pPr algn="ctr">
-              <a:defRPr sz="1600" b="1">
+              <a:defRPr sz="1800" b="1">
                 <a:solidFill>
                   <a:srgbClr val="FFFFFF"/>
                 </a:solidFill>
@@ -7953,24 +8282,56 @@
               </a:defRPr>
             </a:pPr>
             <a:r>
-              <a:t>Architect</a:t>
-            </a:r>
-            <a:br/>
-            <a:r>
-              <a:t>Agent</a:t>
-            </a:r>
-          </a:p>
-        </p:txBody>
-      </p:sp>
-      <p:sp>
-        <p:nvSpPr>
-          <p:cNvPr id="5" name="Rounded Rectangle 4"/>
+              <a:t>Architect Agent</a:t>
+            </a:r>
+          </a:p>
+        </p:txBody>
+      </p:sp>
+      <p:sp>
+        <p:nvSpPr>
+          <p:cNvPr id="5" name="TextBox 4"/>
+          <p:cNvSpPr txBox="1"/>
+          <p:nvPr/>
+        </p:nvSpPr>
+        <p:spPr>
+          <a:xfrm>
+            <a:off x="3200400" y="3520439"/>
+            <a:ext cx="3566160" cy="457200"/>
+          </a:xfrm>
+          <a:prstGeom prst="rect">
+            <a:avLst/>
+          </a:prstGeom>
+          <a:noFill/>
+        </p:spPr>
+        <p:txBody>
+          <a:bodyPr wrap="none">
+            <a:spAutoFit/>
+          </a:bodyPr>
+          <a:lstStyle/>
+          <a:p>
+            <a:pPr algn="ctr">
+              <a:defRPr sz="1100">
+                <a:solidFill>
+                  <a:srgbClr val="FF6B35"/>
+                </a:solidFill>
+                <a:latin typeface="Arial"/>
+              </a:defRPr>
+            </a:pPr>
+            <a:r>
+              <a:t>🏗️ The agent that creates agents</a:t>
+            </a:r>
+          </a:p>
+        </p:txBody>
+      </p:sp>
+      <p:sp>
+        <p:nvSpPr>
+          <p:cNvPr id="6" name="Rounded Rectangle 5"/>
           <p:cNvSpPr/>
           <p:nvPr/>
         </p:nvSpPr>
         <p:spPr>
           <a:xfrm>
-            <a:off x="7772400" y="2286000"/>
+            <a:off x="7315200" y="2011680"/>
             <a:ext cx="2011680" cy="1280160"/>
           </a:xfrm>
           <a:prstGeom prst="roundRect">
@@ -8023,13 +8384,13 @@
       </p:sp>
       <p:sp>
         <p:nvSpPr>
-          <p:cNvPr id="6" name="Rounded Rectangle 5"/>
+          <p:cNvPr id="7" name="Rounded Rectangle 6"/>
           <p:cNvSpPr/>
           <p:nvPr/>
         </p:nvSpPr>
         <p:spPr>
           <a:xfrm>
-            <a:off x="4572000" y="4389120"/>
+            <a:off x="3474720" y="4572000"/>
             <a:ext cx="2011680" cy="1280160"/>
           </a:xfrm>
           <a:prstGeom prst="roundRect">
@@ -8078,13 +8439,13 @@
       </p:sp>
       <p:sp>
         <p:nvSpPr>
-          <p:cNvPr id="7" name="Rounded Rectangle 6"/>
+          <p:cNvPr id="8" name="Rounded Rectangle 7"/>
           <p:cNvSpPr/>
           <p:nvPr/>
         </p:nvSpPr>
         <p:spPr>
           <a:xfrm>
-            <a:off x="7772400" y="4389120"/>
+            <a:off x="7315200" y="4572000"/>
             <a:ext cx="2011680" cy="1280160"/>
           </a:xfrm>
           <a:prstGeom prst="roundRect">
@@ -8137,14 +8498,14 @@
       </p:sp>
       <p:sp>
         <p:nvSpPr>
-          <p:cNvPr id="8" name="Right Arrow 7"/>
+          <p:cNvPr id="9" name="Right Arrow 8"/>
           <p:cNvSpPr/>
           <p:nvPr/>
         </p:nvSpPr>
         <p:spPr>
           <a:xfrm>
-            <a:off x="3474720" y="2788920"/>
-            <a:ext cx="914400" cy="274320"/>
+            <a:off x="2834640" y="2514600"/>
+            <a:ext cx="548639" cy="274320"/>
           </a:xfrm>
           <a:prstGeom prst="rightArrow">
             <a:avLst/>
@@ -8180,14 +8541,49 @@
       </p:sp>
       <p:sp>
         <p:nvSpPr>
-          <p:cNvPr id="9" name="Right Arrow 8"/>
+          <p:cNvPr id="10" name="TextBox 9"/>
+          <p:cNvSpPr txBox="1"/>
+          <p:nvPr/>
+        </p:nvSpPr>
+        <p:spPr>
+          <a:xfrm>
+            <a:off x="2651760" y="2194560"/>
+            <a:ext cx="1097280" cy="274320"/>
+          </a:xfrm>
+          <a:prstGeom prst="rect">
+            <a:avLst/>
+          </a:prstGeom>
+          <a:noFill/>
+        </p:spPr>
+        <p:txBody>
+          <a:bodyPr wrap="none">
+            <a:spAutoFit/>
+          </a:bodyPr>
+          <a:lstStyle/>
+          <a:p>
+            <a:pPr algn="ctr">
+              <a:defRPr sz="900" i="1">
+                <a:solidFill>
+                  <a:srgbClr val="666666"/>
+                </a:solidFill>
+              </a:defRPr>
+            </a:pPr>
+            <a:r>
+              <a:t>Receives</a:t>
+            </a:r>
+          </a:p>
+        </p:txBody>
+      </p:sp>
+      <p:sp>
+        <p:nvSpPr>
+          <p:cNvPr id="11" name="Right Arrow 10"/>
           <p:cNvSpPr/>
           <p:nvPr/>
         </p:nvSpPr>
         <p:spPr>
           <a:xfrm>
-            <a:off x="6675120" y="2788920"/>
-            <a:ext cx="914400" cy="274320"/>
+            <a:off x="6583679" y="2423160"/>
+            <a:ext cx="640080" cy="274320"/>
           </a:xfrm>
           <a:prstGeom prst="rightArrow">
             <a:avLst/>
@@ -8223,14 +8619,49 @@
       </p:sp>
       <p:sp>
         <p:nvSpPr>
-          <p:cNvPr id="10" name="Down Arrow 9"/>
+          <p:cNvPr id="12" name="TextBox 11"/>
+          <p:cNvSpPr txBox="1"/>
+          <p:nvPr/>
+        </p:nvSpPr>
+        <p:spPr>
+          <a:xfrm>
+            <a:off x="6446520" y="2103120"/>
+            <a:ext cx="1097280" cy="274320"/>
+          </a:xfrm>
+          <a:prstGeom prst="rect">
+            <a:avLst/>
+          </a:prstGeom>
+          <a:noFill/>
+        </p:spPr>
+        <p:txBody>
+          <a:bodyPr wrap="none">
+            <a:spAutoFit/>
+          </a:bodyPr>
+          <a:lstStyle/>
+          <a:p>
+            <a:pPr algn="ctr">
+              <a:defRPr sz="900" i="1">
+                <a:solidFill>
+                  <a:srgbClr val="666666"/>
+                </a:solidFill>
+              </a:defRPr>
+            </a:pPr>
+            <a:r>
+              <a:t>Generates</a:t>
+            </a:r>
+          </a:p>
+        </p:txBody>
+      </p:sp>
+      <p:sp>
+        <p:nvSpPr>
+          <p:cNvPr id="13" name="Down Arrow 12"/>
           <p:cNvSpPr/>
           <p:nvPr/>
         </p:nvSpPr>
         <p:spPr>
           <a:xfrm>
-            <a:off x="8641080" y="3657600"/>
-            <a:ext cx="274320" cy="640079"/>
+            <a:off x="8183879" y="3383280"/>
+            <a:ext cx="274320" cy="1097280"/>
           </a:xfrm>
           <a:prstGeom prst="downArrow">
             <a:avLst/>
@@ -8266,14 +8697,49 @@
       </p:sp>
       <p:sp>
         <p:nvSpPr>
-          <p:cNvPr id="11" name="Right Arrow 10"/>
+          <p:cNvPr id="14" name="TextBox 13"/>
+          <p:cNvSpPr txBox="1"/>
+          <p:nvPr/>
+        </p:nvSpPr>
+        <p:spPr>
+          <a:xfrm>
+            <a:off x="8503919" y="3794759"/>
+            <a:ext cx="914400" cy="274320"/>
+          </a:xfrm>
+          <a:prstGeom prst="rect">
+            <a:avLst/>
+          </a:prstGeom>
+          <a:noFill/>
+        </p:spPr>
+        <p:txBody>
+          <a:bodyPr wrap="none">
+            <a:spAutoFit/>
+          </a:bodyPr>
+          <a:lstStyle/>
+          <a:p>
+            <a:pPr>
+              <a:defRPr sz="900" i="1">
+                <a:solidFill>
+                  <a:srgbClr val="666666"/>
+                </a:solidFill>
+              </a:defRPr>
+            </a:pPr>
+            <a:r>
+              <a:t>Persists</a:t>
+            </a:r>
+          </a:p>
+        </p:txBody>
+      </p:sp>
+      <p:sp>
+        <p:nvSpPr>
+          <p:cNvPr id="15" name="Right Arrow 14"/>
           <p:cNvSpPr/>
           <p:nvPr/>
         </p:nvSpPr>
         <p:spPr>
           <a:xfrm>
-            <a:off x="6675120" y="4892040"/>
-            <a:ext cx="914400" cy="274320"/>
+            <a:off x="5577840" y="5074920"/>
+            <a:ext cx="1645920" cy="274320"/>
           </a:xfrm>
           <a:prstGeom prst="rightArrow">
             <a:avLst/>
@@ -8309,16 +8775,51 @@
       </p:sp>
       <p:sp>
         <p:nvSpPr>
-          <p:cNvPr id="12" name="Down Arrow 11"/>
+          <p:cNvPr id="16" name="TextBox 15"/>
+          <p:cNvSpPr txBox="1"/>
+          <p:nvPr/>
+        </p:nvSpPr>
+        <p:spPr>
+          <a:xfrm>
+            <a:off x="5943600" y="4754880"/>
+            <a:ext cx="1097280" cy="274320"/>
+          </a:xfrm>
+          <a:prstGeom prst="rect">
+            <a:avLst/>
+          </a:prstGeom>
+          <a:noFill/>
+        </p:spPr>
+        <p:txBody>
+          <a:bodyPr wrap="none">
+            <a:spAutoFit/>
+          </a:bodyPr>
+          <a:lstStyle/>
+          <a:p>
+            <a:pPr algn="ctr">
+              <a:defRPr sz="900" i="1">
+                <a:solidFill>
+                  <a:srgbClr val="666666"/>
+                </a:solidFill>
+              </a:defRPr>
+            </a:pPr>
+            <a:r>
+              <a:t>Spawns</a:t>
+            </a:r>
+          </a:p>
+        </p:txBody>
+      </p:sp>
+      <p:sp>
+        <p:nvSpPr>
+          <p:cNvPr id="17" name="U-Turn Arrow 16"/>
           <p:cNvSpPr/>
           <p:nvPr/>
         </p:nvSpPr>
         <p:spPr>
           <a:xfrm>
-            <a:off x="8641080" y="3657600"/>
-            <a:ext cx="274320" cy="640080"/>
-          </a:xfrm>
-          <a:prstGeom prst="downArrow">
+            <a:off x="9418319" y="4754880"/>
+            <a:ext cx="914400" cy="1188720"/>
+          </a:xfrm>
+          <a:prstGeom prst="uturnArrow">
             <a:avLst/>
           </a:prstGeom>
           <a:solidFill>
@@ -8347,6 +8848,80 @@
           <a:lstStyle/>
           <a:p>
             <a:pPr algn="ctr"/>
+          </a:p>
+        </p:txBody>
+      </p:sp>
+      <p:sp>
+        <p:nvSpPr>
+          <p:cNvPr id="18" name="TextBox 17"/>
+          <p:cNvSpPr txBox="1"/>
+          <p:nvPr/>
+        </p:nvSpPr>
+        <p:spPr>
+          <a:xfrm>
+            <a:off x="10424159" y="4846320"/>
+            <a:ext cx="1463040" cy="640080"/>
+          </a:xfrm>
+          <a:prstGeom prst="rect">
+            <a:avLst/>
+          </a:prstGeom>
+          <a:noFill/>
+        </p:spPr>
+        <p:txBody>
+          <a:bodyPr wrap="none">
+            <a:spAutoFit/>
+          </a:bodyPr>
+          <a:lstStyle/>
+          <a:p>
+            <a:pPr algn="ctr">
+              <a:defRPr sz="1000" b="1">
+                <a:solidFill>
+                  <a:srgbClr val="FF6B35"/>
+                </a:solidFill>
+              </a:defRPr>
+            </a:pPr>
+            <a:r>
+              <a:t>Can now create</a:t>
+            </a:r>
+            <a:br/>
+            <a:r>
+              <a:t>agents too!</a:t>
+            </a:r>
+          </a:p>
+        </p:txBody>
+      </p:sp>
+      <p:sp>
+        <p:nvSpPr>
+          <p:cNvPr id="19" name="TextBox 18"/>
+          <p:cNvSpPr txBox="1"/>
+          <p:nvPr/>
+        </p:nvSpPr>
+        <p:spPr>
+          <a:xfrm>
+            <a:off x="457200" y="5943600"/>
+            <a:ext cx="11277295" cy="548640"/>
+          </a:xfrm>
+          <a:prstGeom prst="rect">
+            <a:avLst/>
+          </a:prstGeom>
+          <a:noFill/>
+        </p:spPr>
+        <p:txBody>
+          <a:bodyPr wrap="none">
+            <a:spAutoFit/>
+          </a:bodyPr>
+          <a:lstStyle/>
+          <a:p>
+            <a:pPr algn="ctr">
+              <a:defRPr sz="1800" b="1">
+                <a:solidFill>
+                  <a:srgbClr val="0088CC"/>
+                </a:solidFill>
+              </a:defRPr>
+            </a:pPr>
+            <a:r>
+              <a:t>🤔 What happens when created agents can also create agents?</a:t>
+            </a:r>
           </a:p>
         </p:txBody>
       </p:sp>

</xml_diff>

<commit_message>
feat: quality loop agent + presentation polish + subagent refactor plan
- New slides_quality_loop agent chains checker → writer automatically
- Fixed 20 issues (2 critical, 18 important) via quality loop
- Added SUBAGENT_REFACTOR_PLAN.md for future SDK migration
- Enhanced generate_slides.py with diagram improvements
- All slide images extracted for visual review

🤖 Generated with [Claude Code](https://claude.com/claude-code)

Co-Authored-By: Claude <noreply@anthropic.com>
</commit_message>
<xml_diff>
--- a/presentation/output/lightning-agents.pptx
+++ b/presentation/output/lightning-agents.pptx
@@ -3203,7 +3203,7 @@
               </a:defRPr>
             </a:pPr>
             <a:r>
-              <a:t>Ricardo Pirruccio</a:t>
+              <a:t>Riccardo Pirruccio</a:t>
             </a:r>
           </a:p>
         </p:txBody>
@@ -3306,7 +3306,7 @@
         </p:nvSpPr>
         <p:spPr>
           <a:xfrm>
-            <a:off x="457200" y="2560320"/>
+            <a:off x="274320" y="2560320"/>
             <a:ext cx="2011680" cy="1280160"/>
           </a:xfrm>
           <a:prstGeom prst="roundRect">
@@ -3365,7 +3365,7 @@
         </p:nvSpPr>
         <p:spPr>
           <a:xfrm>
-            <a:off x="3017520" y="2560320"/>
+            <a:off x="2560320" y="2560320"/>
             <a:ext cx="2011680" cy="1280160"/>
           </a:xfrm>
           <a:prstGeom prst="roundRect">
@@ -3420,8 +3420,8 @@
         </p:nvSpPr>
         <p:spPr>
           <a:xfrm>
-            <a:off x="2743200" y="3886199"/>
-            <a:ext cx="2560320" cy="457200"/>
+            <a:off x="2103120" y="3886199"/>
+            <a:ext cx="2926080" cy="457200"/>
           </a:xfrm>
           <a:prstGeom prst="rect">
             <a:avLst/>
@@ -3435,15 +3435,15 @@
           <a:lstStyle/>
           <a:p>
             <a:pPr algn="ctr">
-              <a:defRPr sz="1000">
-                <a:solidFill>
-                  <a:srgbClr val="FF6B35"/>
+              <a:defRPr sz="1100" b="1">
+                <a:solidFill>
+                  <a:srgbClr val="1A1A2E"/>
                 </a:solidFill>
                 <a:latin typeface="Arial"/>
               </a:defRPr>
             </a:pPr>
             <a:r>
-              <a:t>🤖 Agent</a:t>
+              <a:t>🤖 Designs</a:t>
             </a:r>
           </a:p>
         </p:txBody>
@@ -3456,7 +3456,7 @@
         </p:nvSpPr>
         <p:spPr>
           <a:xfrm>
-            <a:off x="5577840" y="2560320"/>
+            <a:off x="4846320" y="2560320"/>
             <a:ext cx="2011680" cy="1280160"/>
           </a:xfrm>
           <a:prstGeom prst="flowChartDocument">
@@ -3498,7 +3498,7 @@
               </a:defRPr>
             </a:pPr>
             <a:r>
-              <a:t>📁 db/tools.json</a:t>
+              <a:t>tools.json</a:t>
             </a:r>
           </a:p>
         </p:txBody>
@@ -3511,7 +3511,7 @@
         </p:nvSpPr>
         <p:spPr>
           <a:xfrm>
-            <a:off x="8138160" y="2560320"/>
+            <a:off x="7132320" y="2560320"/>
             <a:ext cx="2011680" cy="1280160"/>
           </a:xfrm>
           <a:prstGeom prst="roundRect">
@@ -3566,8 +3566,8 @@
         </p:nvSpPr>
         <p:spPr>
           <a:xfrm>
-            <a:off x="7863840" y="3886199"/>
-            <a:ext cx="2560320" cy="457200"/>
+            <a:off x="6675120" y="3886199"/>
+            <a:ext cx="2926080" cy="457200"/>
           </a:xfrm>
           <a:prstGeom prst="rect">
             <a:avLst/>
@@ -3581,15 +3581,15 @@
           <a:lstStyle/>
           <a:p>
             <a:pPr algn="ctr">
-              <a:defRPr sz="1000">
-                <a:solidFill>
-                  <a:srgbClr val="FF6B35"/>
+              <a:defRPr sz="1100" b="1">
+                <a:solidFill>
+                  <a:srgbClr val="1A1A2E"/>
                 </a:solidFill>
                 <a:latin typeface="Arial"/>
               </a:defRPr>
             </a:pPr>
             <a:r>
-              <a:t>🤖 Agent</a:t>
+              <a:t>🤖 Builds</a:t>
             </a:r>
           </a:p>
         </p:txBody>
@@ -3602,7 +3602,7 @@
         </p:nvSpPr>
         <p:spPr>
           <a:xfrm>
-            <a:off x="8138160" y="4754880"/>
+            <a:off x="7132320" y="4754880"/>
             <a:ext cx="2011680" cy="1280160"/>
           </a:xfrm>
           <a:prstGeom prst="roundRect">
@@ -3661,7 +3661,7 @@
         </p:nvSpPr>
         <p:spPr>
           <a:xfrm>
-            <a:off x="9006840" y="3931919"/>
+            <a:off x="8001000" y="3931919"/>
             <a:ext cx="274320" cy="731520"/>
           </a:xfrm>
           <a:prstGeom prst="downArrow">
@@ -3704,7 +3704,7 @@
         </p:nvSpPr>
         <p:spPr>
           <a:xfrm>
-            <a:off x="9326880" y="4114799"/>
+            <a:off x="8321040" y="4114799"/>
             <a:ext cx="1371600" cy="365760"/>
           </a:xfrm>
           <a:prstGeom prst="rect">
@@ -3719,14 +3719,14 @@
           <a:lstStyle/>
           <a:p>
             <a:pPr>
-              <a:defRPr sz="900" i="1">
-                <a:solidFill>
-                  <a:srgbClr val="666666"/>
-                </a:solidFill>
-              </a:defRPr>
-            </a:pPr>
-            <a:r>
-              <a:t>Tests &amp; deploys</a:t>
+              <a:defRPr sz="1000" b="1">
+                <a:solidFill>
+                  <a:srgbClr val="1A1A2E"/>
+                </a:solidFill>
+              </a:defRPr>
+            </a:pPr>
+            <a:r>
+              <a:t>deploys</a:t>
             </a:r>
           </a:p>
         </p:txBody>
@@ -3739,8 +3739,8 @@
         </p:nvSpPr>
         <p:spPr>
           <a:xfrm>
-            <a:off x="2560320" y="3063240"/>
-            <a:ext cx="365759" cy="274320"/>
+            <a:off x="2377440" y="3063240"/>
+            <a:ext cx="91439" cy="274320"/>
           </a:xfrm>
           <a:prstGeom prst="rightArrow">
             <a:avLst/>
@@ -3782,7 +3782,7 @@
         </p:nvSpPr>
         <p:spPr>
           <a:xfrm>
-            <a:off x="2286000" y="2743200"/>
+            <a:off x="1965960" y="2743200"/>
             <a:ext cx="1097280" cy="274320"/>
           </a:xfrm>
           <a:prstGeom prst="rect">
@@ -3797,14 +3797,14 @@
           <a:lstStyle/>
           <a:p>
             <a:pPr algn="ctr">
-              <a:defRPr sz="900" i="1">
-                <a:solidFill>
-                  <a:srgbClr val="666666"/>
-                </a:solidFill>
-              </a:defRPr>
-            </a:pPr>
-            <a:r>
-              <a:t>Designs spec</a:t>
+              <a:defRPr sz="1000" b="1">
+                <a:solidFill>
+                  <a:srgbClr val="1A1A2E"/>
+                </a:solidFill>
+              </a:defRPr>
+            </a:pPr>
+            <a:r>
+              <a:t>spec</a:t>
             </a:r>
           </a:p>
         </p:txBody>
@@ -3817,8 +3817,8 @@
         </p:nvSpPr>
         <p:spPr>
           <a:xfrm>
-            <a:off x="5120640" y="3063240"/>
-            <a:ext cx="365759" cy="274320"/>
+            <a:off x="4663440" y="3063240"/>
+            <a:ext cx="91439" cy="274320"/>
           </a:xfrm>
           <a:prstGeom prst="rightArrow">
             <a:avLst/>
@@ -3860,7 +3860,7 @@
         </p:nvSpPr>
         <p:spPr>
           <a:xfrm>
-            <a:off x="4846320" y="2743200"/>
+            <a:off x="4251959" y="2743200"/>
             <a:ext cx="1097280" cy="274320"/>
           </a:xfrm>
           <a:prstGeom prst="rect">
@@ -3875,14 +3875,14 @@
           <a:lstStyle/>
           <a:p>
             <a:pPr algn="ctr">
-              <a:defRPr sz="900" i="1">
-                <a:solidFill>
-                  <a:srgbClr val="666666"/>
-                </a:solidFill>
-              </a:defRPr>
-            </a:pPr>
-            <a:r>
-              <a:t>Persists</a:t>
+              <a:defRPr sz="1000" b="1">
+                <a:solidFill>
+                  <a:srgbClr val="1A1A2E"/>
+                </a:solidFill>
+              </a:defRPr>
+            </a:pPr>
+            <a:r>
+              <a:t>saves</a:t>
             </a:r>
           </a:p>
         </p:txBody>
@@ -3895,8 +3895,8 @@
         </p:nvSpPr>
         <p:spPr>
           <a:xfrm>
-            <a:off x="7680960" y="3063240"/>
-            <a:ext cx="365760" cy="274320"/>
+            <a:off x="6949440" y="3063240"/>
+            <a:ext cx="91439" cy="274320"/>
           </a:xfrm>
           <a:prstGeom prst="rightArrow">
             <a:avLst/>
@@ -3938,7 +3938,7 @@
         </p:nvSpPr>
         <p:spPr>
           <a:xfrm>
-            <a:off x="7406640" y="2743200"/>
+            <a:off x="6537959" y="2743200"/>
             <a:ext cx="1097280" cy="274320"/>
           </a:xfrm>
           <a:prstGeom prst="rect">
@@ -3953,14 +3953,14 @@
           <a:lstStyle/>
           <a:p>
             <a:pPr algn="ctr">
-              <a:defRPr sz="900" i="1">
-                <a:solidFill>
-                  <a:srgbClr val="666666"/>
-                </a:solidFill>
-              </a:defRPr>
-            </a:pPr>
-            <a:r>
-              <a:t>Implements</a:t>
+              <a:defRPr sz="1000" b="1">
+                <a:solidFill>
+                  <a:srgbClr val="1A1A2E"/>
+                </a:solidFill>
+              </a:defRPr>
+            </a:pPr>
+            <a:r>
+              <a:t>reads</a:t>
             </a:r>
           </a:p>
         </p:txBody>
@@ -3973,7 +3973,7 @@
         </p:nvSpPr>
         <p:spPr>
           <a:xfrm>
-            <a:off x="7406640" y="5029200"/>
+            <a:off x="6400800" y="5029200"/>
             <a:ext cx="640080" cy="731520"/>
           </a:xfrm>
           <a:prstGeom prst="curvedLeftArrow">
@@ -4016,7 +4016,7 @@
         </p:nvSpPr>
         <p:spPr>
           <a:xfrm>
-            <a:off x="6126480" y="5029200"/>
+            <a:off x="5120640" y="5029200"/>
             <a:ext cx="1280160" cy="731520"/>
           </a:xfrm>
           <a:prstGeom prst="rect">
@@ -4145,7 +4145,7 @@
         <p:spPr>
           <a:xfrm>
             <a:off x="731520" y="1463040"/>
-            <a:ext cx="10728655" cy="4937760"/>
+            <a:ext cx="10728655" cy="3291840"/>
           </a:xfrm>
           <a:prstGeom prst="roundRect">
             <a:avLst/>
@@ -4190,7 +4190,7 @@
         <p:spPr>
           <a:xfrm>
             <a:off x="914400" y="1645920"/>
-            <a:ext cx="10362895" cy="4572000"/>
+            <a:ext cx="10362895" cy="2926080"/>
           </a:xfrm>
           <a:prstGeom prst="rect">
             <a:avLst/>
@@ -4311,6 +4311,122 @@
             </a:pPr>
             <a:r>
               <a:t>  12 slides in current presentation...</a:t>
+            </a:r>
+          </a:p>
+        </p:txBody>
+      </p:sp>
+      <p:sp>
+        <p:nvSpPr>
+          <p:cNvPr id="5" name="TextBox 4"/>
+          <p:cNvSpPr txBox="1"/>
+          <p:nvPr/>
+        </p:nvSpPr>
+        <p:spPr>
+          <a:xfrm>
+            <a:off x="914400" y="4937760"/>
+            <a:ext cx="10362895" cy="1645920"/>
+          </a:xfrm>
+          <a:prstGeom prst="rect">
+            <a:avLst/>
+          </a:prstGeom>
+          <a:noFill/>
+        </p:spPr>
+        <p:txBody>
+          <a:bodyPr wrap="square">
+            <a:spAutoFit/>
+          </a:bodyPr>
+          <a:lstStyle/>
+          <a:p>
+            <a:pPr>
+              <a:spcBef>
+                <a:spcPts val="800"/>
+              </a:spcBef>
+            </a:pPr>
+            <a:r>
+              <a:rPr sz="1400">
+                <a:solidFill>
+                  <a:srgbClr val="FF6B35"/>
+                </a:solidFill>
+                <a:latin typeface="Consolas"/>
+              </a:rPr>
+              <a:t>lightning list</a:t>
+            </a:r>
+            <a:r>
+              <a:rPr sz="1600">
+                <a:solidFill>
+                  <a:srgbClr val="1A1A2E"/>
+                </a:solidFill>
+                <a:latin typeface="Arial"/>
+              </a:rPr>
+              <a:t> — show all agents in the registry</a:t>
+            </a:r>
+          </a:p>
+          <a:p>
+            <a:pPr>
+              <a:spcBef>
+                <a:spcPts val="800"/>
+              </a:spcBef>
+            </a:pPr>
+            <a:r>
+              <a:rPr sz="1400">
+                <a:solidFill>
+                  <a:srgbClr val="FF6B35"/>
+                </a:solidFill>
+                <a:latin typeface="Consolas"/>
+              </a:rPr>
+              <a:t>lightning run &lt;agent&gt;</a:t>
+            </a:r>
+            <a:r>
+              <a:rPr sz="1600">
+                <a:solidFill>
+                  <a:srgbClr val="1A1A2E"/>
+                </a:solidFill>
+                <a:latin typeface="Arial"/>
+              </a:rPr>
+              <a:t> — invoke any agent with natural language</a:t>
+            </a:r>
+          </a:p>
+          <a:p>
+            <a:pPr>
+              <a:spcBef>
+                <a:spcPts val="800"/>
+              </a:spcBef>
+            </a:pPr>
+            <a:r>
+              <a:rPr sz="1600" b="1">
+                <a:solidFill>
+                  <a:srgbClr val="0088CC"/>
+                </a:solidFill>
+                <a:latin typeface="Arial"/>
+              </a:rPr>
+              <a:t>10+ agents</a:t>
+            </a:r>
+            <a:r>
+              <a:rPr sz="1600">
+                <a:solidFill>
+                  <a:srgbClr val="1A1A2E"/>
+                </a:solidFill>
+                <a:latin typeface="Arial"/>
+              </a:rPr>
+              <a:t> all from one </a:t>
+            </a:r>
+            <a:r>
+              <a:rPr sz="1400">
+                <a:solidFill>
+                  <a:srgbClr val="FF6B35"/>
+                </a:solidFill>
+                <a:latin typeface="Consolas"/>
+              </a:rPr>
+              <a:t>agents.json</a:t>
+            </a:r>
+            <a:r>
+              <a:rPr sz="1600">
+                <a:solidFill>
+                  <a:srgbClr val="1A1A2E"/>
+                </a:solidFill>
+                <a:latin typeface="Arial"/>
+              </a:rPr>
+              <a:t> file</a:t>
             </a:r>
           </a:p>
         </p:txBody>
@@ -4364,7 +4480,7 @@
               </a:defRPr>
             </a:pPr>
             <a:r>
-              <a:t>The Meta Moment</a:t>
+              <a:t>The Meta Moment 🤯</a:t>
             </a:r>
           </a:p>
         </p:txBody>
@@ -4548,7 +4664,7 @@
                 </a:solidFill>
                 <a:latin typeface="Arial"/>
               </a:rPr>
-              <a:t>This slide</a:t>
+              <a:t>Agents all the way down:</a:t>
             </a:r>
             <a:r>
               <a:rPr sz="1800">
@@ -4557,7 +4673,7 @@
                 </a:solidFill>
                 <a:latin typeface="Arial"/>
               </a:rPr>
-              <a:t> was created by an agent that was created by an agent</a:t>
+              <a:t> Architect → Slide Writer → This Slide</a:t>
             </a:r>
           </a:p>
         </p:txBody>
@@ -4755,6 +4871,76 @@
               </a:spcBef>
             </a:pPr>
             <a:r>
+              <a:rPr sz="1800">
+                <a:solidFill>
+                  <a:srgbClr val="1A1A2E"/>
+                </a:solidFill>
+                <a:latin typeface="Arial"/>
+              </a:rPr>
+              <a:t>📦 </a:t>
+            </a:r>
+            <a:r>
+              <a:rPr b="1" sz="1800">
+                <a:solidFill>
+                  <a:srgbClr val="0088CC"/>
+                </a:solidFill>
+                <a:latin typeface="Arial"/>
+              </a:rPr>
+              <a:t>This project:</a:t>
+            </a:r>
+            <a:r>
+              <a:rPr sz="1800">
+                <a:solidFill>
+                  <a:srgbClr val="1A1A2E"/>
+                </a:solidFill>
+                <a:latin typeface="Arial"/>
+              </a:rPr>
+              <a:t> </a:t>
+            </a:r>
+            <a:r>
+              <a:rPr sz="1600">
+                <a:solidFill>
+                  <a:srgbClr val="FF6B35"/>
+                </a:solidFill>
+                <a:latin typeface="Consolas"/>
+              </a:rPr>
+              <a:t>github.com/RPirruccio/lightning-agents</a:t>
+            </a:r>
+          </a:p>
+          <a:p>
+            <a:pPr algn="ctr">
+              <a:spcBef>
+                <a:spcPts val="1600"/>
+              </a:spcBef>
+            </a:pPr>
+            <a:r>
+              <a:rPr sz="1800">
+                <a:solidFill>
+                  <a:srgbClr val="1A1A2E"/>
+                </a:solidFill>
+                <a:latin typeface="Arial"/>
+              </a:rPr>
+              <a:t>🤝 </a:t>
+            </a:r>
+            <a:r>
+              <a:rPr b="1" sz="1800">
+                <a:solidFill>
+                  <a:srgbClr val="0088CC"/>
+                </a:solidFill>
+                <a:latin typeface="Arial"/>
+              </a:rPr>
+              <a:t>AIMUG community:</a:t>
+            </a:r>
+            <a:r>
+              <a:rPr sz="1800">
+                <a:solidFill>
+                  <a:srgbClr val="1A1A2E"/>
+                </a:solidFill>
+                <a:latin typeface="Arial"/>
+              </a:rPr>
+              <a:t> </a:t>
+            </a:r>
+            <a:r>
               <a:rPr sz="1600">
                 <a:solidFill>
                   <a:srgbClr val="FF6B35"/>
@@ -4851,7 +5037,7 @@
               </a:defRPr>
             </a:pPr>
             <a:r>
-              <a:t>Before &amp; After</a:t>
+              <a:t>The Problem &amp; Solution</a:t>
             </a:r>
           </a:p>
         </p:txBody>
@@ -4931,7 +5117,7 @@
               </a:defRPr>
             </a:pPr>
             <a:r>
-              <a:t>TYPICAL AGENT CODE</a:t>
+              <a:t>❌ TYPICAL AGENT CODE</a:t>
             </a:r>
           </a:p>
         </p:txBody>
@@ -5109,7 +5295,7 @@
               </a:defRPr>
             </a:pPr>
             <a:r>
-              <a:t>FACTORY-OF-FACTORIES</a:t>
+              <a:t>✅ FACTORY-OF-FACTORIES</a:t>
             </a:r>
           </a:p>
         </p:txBody>
@@ -5147,7 +5333,7 @@
               </a:defRPr>
             </a:pPr>
             <a:r>
-              <a:t>✓ One agents.json file</a:t>
+              <a:t>✓ One agents.json (single source of truth)</a:t>
             </a:r>
           </a:p>
           <a:p>
@@ -5313,7 +5499,7 @@
               </a:defRPr>
             </a:pPr>
             <a:r>
-              <a:t>VOYAGER (2023)</a:t>
+              <a:t>🎮 VOYAGER (Minecraft AI)</a:t>
             </a:r>
           </a:p>
         </p:txBody>
@@ -5365,7 +5551,7 @@
               </a:defRPr>
             </a:pPr>
             <a:r>
-              <a:t>LIGHTNING AGENTS</a:t>
+              <a:t>⚡ LIGHTNING AGENTS</a:t>
             </a:r>
           </a:p>
         </p:txBody>
@@ -5712,7 +5898,7 @@
               </a:defRPr>
             </a:pPr>
             <a:r>
-              <a:t>Retrieves when needed</a:t>
+              <a:t>Retrieves skill when needed</a:t>
             </a:r>
           </a:p>
         </p:txBody>
@@ -5747,7 +5933,7 @@
               </a:defRPr>
             </a:pPr>
             <a:r>
-              <a:t>Registry.create()</a:t>
+              <a:t>Retrieves agent via Registry.create()</a:t>
             </a:r>
           </a:p>
         </p:txBody>
@@ -5817,7 +6003,7 @@
               </a:defRPr>
             </a:pPr>
             <a:r>
-              <a:t>Agents create agents</a:t>
+              <a:t>Agents create agents over time</a:t>
             </a:r>
           </a:p>
         </p:txBody>
@@ -6010,7 +6196,7 @@
               </a:defRPr>
             </a:pPr>
             <a:r>
-              <a:t>Voyager (2023)</a:t>
+              <a:t>Voyager</a:t>
             </a:r>
           </a:p>
         </p:txBody>
@@ -6374,7 +6560,15 @@
               </a:defRPr>
             </a:pPr>
             <a:r>
-              <a:t>Factory-of-Factories</a:t>
+              <a:t>Factory-of-Factories:</a:t>
+            </a:r>
+            <a:br/>
+            <a:r>
+              <a:t>Agents that create agents</a:t>
+            </a:r>
+            <a:br/>
+            <a:r>
+              <a:t>from declarative configs</a:t>
             </a:r>
           </a:p>
         </p:txBody>
@@ -7298,7 +7492,7 @@
               </a:defRPr>
             </a:pPr>
             <a:r>
-              <a:t>def create_agent(config):</a:t>
+              <a:t># One factory, one agent type</a:t>
             </a:r>
           </a:p>
           <a:p>
@@ -7311,7 +7505,43 @@
               </a:defRPr>
             </a:pPr>
             <a:r>
+              <a:t>def create_agent(config):</a:t>
+            </a:r>
+          </a:p>
+          <a:p>
+            <a:pPr>
+              <a:defRPr sz="1400">
+                <a:solidFill>
+                  <a:srgbClr val="1A1A2E"/>
+                </a:solidFill>
+                <a:latin typeface="Consolas"/>
+              </a:defRPr>
+            </a:pPr>
+            <a:r>
               <a:t>    return Agent(config)</a:t>
+            </a:r>
+          </a:p>
+          <a:p>
+            <a:pPr>
+              <a:defRPr sz="1400">
+                <a:solidFill>
+                  <a:srgbClr val="1A1A2E"/>
+                </a:solidFill>
+                <a:latin typeface="Consolas"/>
+              </a:defRPr>
+            </a:pPr>
+          </a:p>
+          <a:p>
+            <a:pPr>
+              <a:defRPr sz="1400">
+                <a:solidFill>
+                  <a:srgbClr val="1A1A2E"/>
+                </a:solidFill>
+                <a:latin typeface="Consolas"/>
+              </a:defRPr>
+            </a:pPr>
+            <a:r>
+              <a:t># Each new agent = new factory</a:t>
             </a:r>
           </a:p>
         </p:txBody>
@@ -7427,7 +7657,7 @@
               </a:defRPr>
             </a:pPr>
             <a:r>
-              <a:t>registry = AgentRegistry.from_json(</a:t>
+              <a:t># Registry builds factories dynamically</a:t>
             </a:r>
           </a:p>
           <a:p>
@@ -7440,7 +7670,7 @@
               </a:defRPr>
             </a:pPr>
             <a:r>
-              <a:t>    "agents.json"</a:t>
+              <a:t>registry = AgentRegistry.from_json(</a:t>
             </a:r>
           </a:p>
           <a:p>
@@ -7453,7 +7683,7 @@
               </a:defRPr>
             </a:pPr>
             <a:r>
-              <a:t>)</a:t>
+              <a:t>    "agents.json"</a:t>
             </a:r>
           </a:p>
           <a:p>
@@ -7466,7 +7696,7 @@
               </a:defRPr>
             </a:pPr>
             <a:r>
-              <a:t>agent = registry.create(</a:t>
+              <a:t>)</a:t>
             </a:r>
           </a:p>
           <a:p>
@@ -7479,7 +7709,7 @@
               </a:defRPr>
             </a:pPr>
             <a:r>
-              <a:t>    "researcher", {"topic": "AI"}</a:t>
+              <a:t>agent = registry.create(</a:t>
             </a:r>
           </a:p>
           <a:p>
@@ -7492,7 +7722,33 @@
               </a:defRPr>
             </a:pPr>
             <a:r>
+              <a:t>    "researcher", {"topic": "AI"}</a:t>
+            </a:r>
+          </a:p>
+          <a:p>
+            <a:pPr>
+              <a:defRPr sz="1400">
+                <a:solidFill>
+                  <a:srgbClr val="1A1A2E"/>
+                </a:solidFill>
+                <a:latin typeface="Consolas"/>
+              </a:defRPr>
+            </a:pPr>
+            <a:r>
               <a:t>)</a:t>
+            </a:r>
+          </a:p>
+          <a:p>
+            <a:pPr>
+              <a:defRPr sz="1400">
+                <a:solidFill>
+                  <a:srgbClr val="1A1A2E"/>
+                </a:solidFill>
+                <a:latin typeface="Consolas"/>
+              </a:defRPr>
+            </a:pPr>
+            <a:r>
+              <a:t># Any agent from one registry!</a:t>
             </a:r>
           </a:p>
         </p:txBody>
@@ -7560,7 +7816,7 @@
         <p:spPr>
           <a:xfrm>
             <a:off x="731520" y="1463040"/>
-            <a:ext cx="10728655" cy="4937760"/>
+            <a:ext cx="10728655" cy="3291840"/>
           </a:xfrm>
           <a:prstGeom prst="roundRect">
             <a:avLst/>
@@ -7605,7 +7861,7 @@
         <p:spPr>
           <a:xfrm>
             <a:off x="914400" y="1645920"/>
-            <a:ext cx="10362895" cy="4572000"/>
+            <a:ext cx="10362895" cy="2926080"/>
           </a:xfrm>
           <a:prstGeom prst="rect">
             <a:avLst/>
@@ -7784,6 +8040,104 @@
             </a:pPr>
             <a:r>
               <a:t>}</a:t>
+            </a:r>
+          </a:p>
+        </p:txBody>
+      </p:sp>
+      <p:sp>
+        <p:nvSpPr>
+          <p:cNvPr id="5" name="TextBox 4"/>
+          <p:cNvSpPr txBox="1"/>
+          <p:nvPr/>
+        </p:nvSpPr>
+        <p:spPr>
+          <a:xfrm>
+            <a:off x="914400" y="4937760"/>
+            <a:ext cx="10362895" cy="1645920"/>
+          </a:xfrm>
+          <a:prstGeom prst="rect">
+            <a:avLst/>
+          </a:prstGeom>
+          <a:noFill/>
+        </p:spPr>
+        <p:txBody>
+          <a:bodyPr wrap="square">
+            <a:spAutoFit/>
+          </a:bodyPr>
+          <a:lstStyle/>
+          <a:p>
+            <a:pPr>
+              <a:spcBef>
+                <a:spcPts val="800"/>
+              </a:spcBef>
+            </a:pPr>
+            <a:r>
+              <a:rPr sz="1600" b="1">
+                <a:solidFill>
+                  <a:srgbClr val="0088CC"/>
+                </a:solidFill>
+                <a:latin typeface="Arial"/>
+              </a:rPr>
+              <a:t>JSON, not code</a:t>
+            </a:r>
+            <a:r>
+              <a:rPr sz="1600">
+                <a:solidFill>
+                  <a:srgbClr val="1A1A2E"/>
+                </a:solidFill>
+                <a:latin typeface="Arial"/>
+              </a:rPr>
+              <a:t> — agents defined declaratively in agents.json</a:t>
+            </a:r>
+          </a:p>
+          <a:p>
+            <a:pPr>
+              <a:spcBef>
+                <a:spcPts val="800"/>
+              </a:spcBef>
+            </a:pPr>
+            <a:r>
+              <a:rPr sz="1600" b="1">
+                <a:solidFill>
+                  <a:srgbClr val="0088CC"/>
+                </a:solidFill>
+                <a:latin typeface="Arial"/>
+              </a:rPr>
+              <a:t>Context engineering</a:t>
+            </a:r>
+            <a:r>
+              <a:rPr sz="1600">
+                <a:solidFill>
+                  <a:srgbClr val="1A1A2E"/>
+                </a:solidFill>
+                <a:latin typeface="Arial"/>
+              </a:rPr>
+              <a:t> — the system_prompt is where the magic happens</a:t>
+            </a:r>
+          </a:p>
+          <a:p>
+            <a:pPr>
+              <a:spcBef>
+                <a:spcPts val="800"/>
+              </a:spcBef>
+            </a:pPr>
+            <a:r>
+              <a:rPr sz="1600" b="1">
+                <a:solidFill>
+                  <a:srgbClr val="0088CC"/>
+                </a:solidFill>
+                <a:latin typeface="Arial"/>
+              </a:rPr>
+              <a:t>Composable tools</a:t>
+            </a:r>
+            <a:r>
+              <a:rPr sz="1600">
+                <a:solidFill>
+                  <a:srgbClr val="1A1A2E"/>
+                </a:solidFill>
+                <a:latin typeface="Arial"/>
+              </a:rPr>
+              <a:t> — agents can invoke other agents via run_agent</a:t>
             </a:r>
           </a:p>
         </p:txBody>
@@ -8064,7 +8418,7 @@
                 </a:solidFill>
                 <a:latin typeface="Arial"/>
               </a:rPr>
-              <a:t> for all agent definitions</a:t>
+              <a:t> — all agent definitions in one place</a:t>
             </a:r>
           </a:p>
           <a:p>
@@ -8089,7 +8443,7 @@
                 </a:solidFill>
                 <a:latin typeface="Arial"/>
               </a:rPr>
-              <a:t> - agents spawn new agents on demand</a:t>
+              <a:t> — agents spawn new agents on demand</a:t>
             </a:r>
           </a:p>
           <a:p>
@@ -8114,7 +8468,7 @@
                 </a:solidFill>
                 <a:latin typeface="Arial"/>
               </a:rPr>
-              <a:t> - architects can register new agents</a:t>
+              <a:t> — architects can register new agents dynamically</a:t>
             </a:r>
           </a:p>
         </p:txBody>
@@ -8295,8 +8649,8 @@
         </p:nvSpPr>
         <p:spPr>
           <a:xfrm>
-            <a:off x="3200400" y="3520439"/>
-            <a:ext cx="3566160" cy="457200"/>
+            <a:off x="3017520" y="3520439"/>
+            <a:ext cx="3931920" cy="457200"/>
           </a:xfrm>
           <a:prstGeom prst="rect">
             <a:avLst/>
@@ -8310,9 +8664,9 @@
           <a:lstStyle/>
           <a:p>
             <a:pPr algn="ctr">
-              <a:defRPr sz="1100">
-                <a:solidFill>
-                  <a:srgbClr val="FF6B35"/>
+              <a:defRPr sz="1200" b="1">
+                <a:solidFill>
+                  <a:srgbClr val="1A1A2E"/>
                 </a:solidFill>
                 <a:latin typeface="Arial"/>
               </a:defRPr>
@@ -8562,9 +8916,9 @@
           <a:lstStyle/>
           <a:p>
             <a:pPr algn="ctr">
-              <a:defRPr sz="900" i="1">
-                <a:solidFill>
-                  <a:srgbClr val="666666"/>
+              <a:defRPr sz="1000" b="1">
+                <a:solidFill>
+                  <a:srgbClr val="1A1A2E"/>
                 </a:solidFill>
               </a:defRPr>
             </a:pPr>
@@ -8640,9 +8994,9 @@
           <a:lstStyle/>
           <a:p>
             <a:pPr algn="ctr">
-              <a:defRPr sz="900" i="1">
-                <a:solidFill>
-                  <a:srgbClr val="666666"/>
+              <a:defRPr sz="1000" b="1">
+                <a:solidFill>
+                  <a:srgbClr val="1A1A2E"/>
                 </a:solidFill>
               </a:defRPr>
             </a:pPr>
@@ -8718,9 +9072,9 @@
           <a:lstStyle/>
           <a:p>
             <a:pPr>
-              <a:defRPr sz="900" i="1">
-                <a:solidFill>
-                  <a:srgbClr val="666666"/>
+              <a:defRPr sz="1000" b="1">
+                <a:solidFill>
+                  <a:srgbClr val="1A1A2E"/>
                 </a:solidFill>
               </a:defRPr>
             </a:pPr>
@@ -8796,9 +9150,9 @@
           <a:lstStyle/>
           <a:p>
             <a:pPr algn="ctr">
-              <a:defRPr sz="900" i="1">
-                <a:solidFill>
-                  <a:srgbClr val="666666"/>
+              <a:defRPr sz="1000" b="1">
+                <a:solidFill>
+                  <a:srgbClr val="1A1A2E"/>
                 </a:solidFill>
               </a:defRPr>
             </a:pPr>

</xml_diff>